<commit_message>
final_final version initial commit
</commit_message>
<xml_diff>
--- a/Assignment#1.pptx
+++ b/Assignment#1.pptx
@@ -5,13 +5,22 @@
     <p:sldMasterId id="2147483660" r:id="rId1"/>
   </p:sldMasterIdLst>
   <p:notesMasterIdLst>
-    <p:notesMasterId r:id="rId6"/>
+    <p:notesMasterId r:id="rId15"/>
   </p:notesMasterIdLst>
   <p:sldIdLst>
     <p:sldId id="256" r:id="rId2"/>
     <p:sldId id="257" r:id="rId3"/>
     <p:sldId id="258" r:id="rId4"/>
     <p:sldId id="259" r:id="rId5"/>
+    <p:sldId id="260" r:id="rId6"/>
+    <p:sldId id="261" r:id="rId7"/>
+    <p:sldId id="262" r:id="rId8"/>
+    <p:sldId id="263" r:id="rId9"/>
+    <p:sldId id="268" r:id="rId10"/>
+    <p:sldId id="264" r:id="rId11"/>
+    <p:sldId id="267" r:id="rId12"/>
+    <p:sldId id="265" r:id="rId13"/>
+    <p:sldId id="266" r:id="rId14"/>
   </p:sldIdLst>
   <p:sldSz cx="9144000" cy="6858000" type="screen4x3"/>
   <p:notesSz cx="6858000" cy="9144000"/>
@@ -200,7 +209,7 @@
           <a:p>
             <a:fld id="{F5322157-282B-4E98-930A-53EE21F0A964}" type="datetimeFigureOut">
               <a:rPr lang="en-CA" smtClean="0"/>
-              <a:t>2020-09-12</a:t>
+              <a:t>2020-09-13</a:t>
             </a:fld>
             <a:endParaRPr lang="en-CA"/>
           </a:p>
@@ -529,84 +538,6 @@
               <a:tabLst/>
               <a:defRPr/>
             </a:pPr>
-            <a:r>
-              <a:rPr lang="en-CA" dirty="0"/>
-              <a:t>(and Band of Canada has no plans to start raising rates until at least 2023)</a:t>
-            </a:r>
-          </a:p>
-          <a:p>
-            <a:endParaRPr lang="en-CA" sz="1200" b="1" i="0" kern="1200" dirty="0">
-              <a:solidFill>
-                <a:schemeClr val="tx1"/>
-              </a:solidFill>
-              <a:effectLst/>
-              <a:latin typeface="+mn-lt"/>
-              <a:ea typeface="+mn-ea"/>
-              <a:cs typeface="+mn-cs"/>
-            </a:endParaRPr>
-          </a:p>
-          <a:p>
-            <a:r>
-              <a:rPr lang="en-CA" sz="1200" b="1" i="0" kern="1200" dirty="0">
-                <a:solidFill>
-                  <a:schemeClr val="tx1"/>
-                </a:solidFill>
-                <a:effectLst/>
-                <a:latin typeface="+mn-lt"/>
-                <a:ea typeface="+mn-ea"/>
-                <a:cs typeface="+mn-cs"/>
-              </a:rPr>
-              <a:t>Rates have already been falling significantly over the last couple of months, with many mortgage rates—including insured 5-year </a:t>
-            </a:r>
-            <a:r>
-              <a:rPr lang="en-CA" sz="1200" b="1" i="0" kern="1200" dirty="0" err="1">
-                <a:solidFill>
-                  <a:schemeClr val="tx1"/>
-                </a:solidFill>
-                <a:effectLst/>
-                <a:latin typeface="+mn-lt"/>
-                <a:ea typeface="+mn-ea"/>
-                <a:cs typeface="+mn-cs"/>
-              </a:rPr>
-              <a:t>fixeds</a:t>
-            </a:r>
-            <a:r>
-              <a:rPr lang="en-CA" sz="1200" b="1" i="0" kern="1200" dirty="0">
-                <a:solidFill>
-                  <a:schemeClr val="tx1"/>
-                </a:solidFill>
-                <a:effectLst/>
-                <a:latin typeface="+mn-lt"/>
-                <a:ea typeface="+mn-ea"/>
-                <a:cs typeface="+mn-cs"/>
-              </a:rPr>
-              <a:t>—now available for under 2.00%.</a:t>
-            </a:r>
-          </a:p>
-          <a:p>
-            <a:endParaRPr lang="en-CA" sz="1200" b="1" i="0" kern="1200" dirty="0">
-              <a:solidFill>
-                <a:schemeClr val="tx1"/>
-              </a:solidFill>
-              <a:effectLst/>
-              <a:latin typeface="+mn-lt"/>
-              <a:ea typeface="+mn-ea"/>
-              <a:cs typeface="+mn-cs"/>
-            </a:endParaRPr>
-          </a:p>
-          <a:p>
-            <a:r>
-              <a:rPr lang="en-CA" sz="1200" b="0" i="0" kern="1200" dirty="0">
-                <a:solidFill>
-                  <a:schemeClr val="tx1"/>
-                </a:solidFill>
-                <a:effectLst/>
-                <a:latin typeface="+mn-lt"/>
-                <a:ea typeface="+mn-ea"/>
-                <a:cs typeface="+mn-cs"/>
-              </a:rPr>
-              <a:t>Perhaps. With interest rates at historic lows, if you are able to buy and hold a home for the medium to long term, this might be a good time to buy</a:t>
-            </a:r>
             <a:endParaRPr lang="en-CA" dirty="0"/>
           </a:p>
         </p:txBody>
@@ -708,77 +639,6 @@
               <a:tabLst/>
               <a:defRPr/>
             </a:pPr>
-            <a:r>
-              <a:rPr lang="en-CA" dirty="0"/>
-              <a:t>I used </a:t>
-            </a:r>
-            <a:r>
-              <a:rPr lang="en-CA" dirty="0" err="1"/>
-              <a:t>HouseSigma</a:t>
-            </a:r>
-            <a:r>
-              <a:rPr lang="en-CA" dirty="0"/>
-              <a:t>, a free Canadian website, that curates real estate listings, and estimates home values in real time.</a:t>
-            </a:r>
-          </a:p>
-          <a:p>
-            <a:pPr marL="0" marR="0" lvl="0" indent="0" algn="l" defTabSz="914400" rtl="0" eaLnBrk="1" fontAlgn="auto" latinLnBrk="0" hangingPunct="1">
-              <a:lnSpc>
-                <a:spcPct val="100000"/>
-              </a:lnSpc>
-              <a:spcBef>
-                <a:spcPts val="0"/>
-              </a:spcBef>
-              <a:spcAft>
-                <a:spcPts val="0"/>
-              </a:spcAft>
-              <a:buClrTx/>
-              <a:buSzTx/>
-              <a:buFontTx/>
-              <a:buNone/>
-              <a:tabLst/>
-              <a:defRPr/>
-            </a:pPr>
-            <a:r>
-              <a:rPr lang="en-CA" dirty="0"/>
-              <a:t>Since this website is highly interactive where I would have to click on individual listings, I decided to use </a:t>
-            </a:r>
-            <a:r>
-              <a:rPr lang="en-CA"/>
-              <a:t>Selenium package which automates web browser interaction from Python. </a:t>
-            </a:r>
-            <a:r>
-              <a:rPr lang="en-CA" sz="1200" b="0" i="0" kern="1200">
-                <a:solidFill>
-                  <a:schemeClr val="tx1"/>
-                </a:solidFill>
-                <a:effectLst/>
-                <a:latin typeface="+mn-lt"/>
-                <a:ea typeface="+mn-ea"/>
-                <a:cs typeface="+mn-cs"/>
-              </a:rPr>
-              <a:t>Selenium enables you to create step-by-step interactions with a webpage (HouseSigma) and assess the response of a browser to various changes.</a:t>
-            </a:r>
-            <a:endParaRPr lang="en-CA" dirty="0"/>
-          </a:p>
-          <a:p>
-            <a:pPr marL="0" marR="0" lvl="0" indent="0" algn="l" defTabSz="914400" rtl="0" eaLnBrk="1" fontAlgn="auto" latinLnBrk="0" hangingPunct="1">
-              <a:lnSpc>
-                <a:spcPct val="100000"/>
-              </a:lnSpc>
-              <a:spcBef>
-                <a:spcPts val="0"/>
-              </a:spcBef>
-              <a:spcAft>
-                <a:spcPts val="0"/>
-              </a:spcAft>
-              <a:buClrTx/>
-              <a:buSzTx/>
-              <a:buFontTx/>
-              <a:buNone/>
-              <a:tabLst/>
-              <a:defRPr/>
-            </a:pPr>
             <a:endParaRPr lang="en-CA" dirty="0"/>
           </a:p>
         </p:txBody>
@@ -862,60 +722,6 @@
         <p:txBody>
           <a:bodyPr/>
           <a:lstStyle/>
-          <a:p>
-            <a:pPr marL="0" marR="0" lvl="0" indent="0" algn="l" defTabSz="914400" rtl="0" eaLnBrk="1" fontAlgn="auto" latinLnBrk="0" hangingPunct="1">
-              <a:lnSpc>
-                <a:spcPct val="100000"/>
-              </a:lnSpc>
-              <a:spcBef>
-                <a:spcPts val="0"/>
-              </a:spcBef>
-              <a:spcAft>
-                <a:spcPts val="0"/>
-              </a:spcAft>
-              <a:buClrTx/>
-              <a:buSzTx/>
-              <a:buFontTx/>
-              <a:buNone/>
-              <a:tabLst/>
-              <a:defRPr/>
-            </a:pPr>
-            <a:r>
-              <a:rPr lang="en-CA" dirty="0"/>
-              <a:t>I used </a:t>
-            </a:r>
-            <a:r>
-              <a:rPr lang="en-CA" dirty="0" err="1"/>
-              <a:t>HouseSigma</a:t>
-            </a:r>
-            <a:r>
-              <a:rPr lang="en-CA" dirty="0"/>
-              <a:t>, a free Canadian website, that curates real estate listings, and estimates home values in real time.</a:t>
-            </a:r>
-          </a:p>
-          <a:p>
-            <a:pPr marL="0" marR="0" lvl="0" indent="0" algn="l" defTabSz="914400" rtl="0" eaLnBrk="1" fontAlgn="auto" latinLnBrk="0" hangingPunct="1">
-              <a:lnSpc>
-                <a:spcPct val="100000"/>
-              </a:lnSpc>
-              <a:spcBef>
-                <a:spcPts val="0"/>
-              </a:spcBef>
-              <a:spcAft>
-                <a:spcPts val="0"/>
-              </a:spcAft>
-              <a:buClrTx/>
-              <a:buSzTx/>
-              <a:buFontTx/>
-              <a:buNone/>
-              <a:tabLst/>
-              <a:defRPr/>
-            </a:pPr>
-            <a:r>
-              <a:rPr lang="en-CA" dirty="0"/>
-              <a:t>Since this website is highly interactive where I would have to click on individual listings, I decided to use </a:t>
-            </a:r>
-          </a:p>
           <a:p>
             <a:pPr marL="0" marR="0" lvl="0" indent="0" algn="l" defTabSz="914400" rtl="0" eaLnBrk="1" fontAlgn="auto" latinLnBrk="0" hangingPunct="1">
               <a:lnSpc>
@@ -1105,7 +911,7 @@
           <a:p>
             <a:fld id="{3FA768BD-26DD-4A5E-93D2-95A07704EAD0}" type="datetimeFigureOut">
               <a:rPr lang="en-CA" smtClean="0"/>
-              <a:t>2020-09-12</a:t>
+              <a:t>2020-09-13</a:t>
             </a:fld>
             <a:endParaRPr lang="en-CA"/>
           </a:p>
@@ -1275,7 +1081,7 @@
           <a:p>
             <a:fld id="{3FA768BD-26DD-4A5E-93D2-95A07704EAD0}" type="datetimeFigureOut">
               <a:rPr lang="en-CA" smtClean="0"/>
-              <a:t>2020-09-12</a:t>
+              <a:t>2020-09-13</a:t>
             </a:fld>
             <a:endParaRPr lang="en-CA"/>
           </a:p>
@@ -1455,7 +1261,7 @@
           <a:p>
             <a:fld id="{3FA768BD-26DD-4A5E-93D2-95A07704EAD0}" type="datetimeFigureOut">
               <a:rPr lang="en-CA" smtClean="0"/>
-              <a:t>2020-09-12</a:t>
+              <a:t>2020-09-13</a:t>
             </a:fld>
             <a:endParaRPr lang="en-CA"/>
           </a:p>
@@ -1625,7 +1431,7 @@
           <a:p>
             <a:fld id="{3FA768BD-26DD-4A5E-93D2-95A07704EAD0}" type="datetimeFigureOut">
               <a:rPr lang="en-CA" smtClean="0"/>
-              <a:t>2020-09-12</a:t>
+              <a:t>2020-09-13</a:t>
             </a:fld>
             <a:endParaRPr lang="en-CA"/>
           </a:p>
@@ -1869,7 +1675,7 @@
           <a:p>
             <a:fld id="{3FA768BD-26DD-4A5E-93D2-95A07704EAD0}" type="datetimeFigureOut">
               <a:rPr lang="en-CA" smtClean="0"/>
-              <a:t>2020-09-12</a:t>
+              <a:t>2020-09-13</a:t>
             </a:fld>
             <a:endParaRPr lang="en-CA"/>
           </a:p>
@@ -2101,7 +1907,7 @@
           <a:p>
             <a:fld id="{3FA768BD-26DD-4A5E-93D2-95A07704EAD0}" type="datetimeFigureOut">
               <a:rPr lang="en-CA" smtClean="0"/>
-              <a:t>2020-09-12</a:t>
+              <a:t>2020-09-13</a:t>
             </a:fld>
             <a:endParaRPr lang="en-CA"/>
           </a:p>
@@ -2468,7 +2274,7 @@
           <a:p>
             <a:fld id="{3FA768BD-26DD-4A5E-93D2-95A07704EAD0}" type="datetimeFigureOut">
               <a:rPr lang="en-CA" smtClean="0"/>
-              <a:t>2020-09-12</a:t>
+              <a:t>2020-09-13</a:t>
             </a:fld>
             <a:endParaRPr lang="en-CA"/>
           </a:p>
@@ -2586,7 +2392,7 @@
           <a:p>
             <a:fld id="{3FA768BD-26DD-4A5E-93D2-95A07704EAD0}" type="datetimeFigureOut">
               <a:rPr lang="en-CA" smtClean="0"/>
-              <a:t>2020-09-12</a:t>
+              <a:t>2020-09-13</a:t>
             </a:fld>
             <a:endParaRPr lang="en-CA"/>
           </a:p>
@@ -2681,7 +2487,7 @@
           <a:p>
             <a:fld id="{3FA768BD-26DD-4A5E-93D2-95A07704EAD0}" type="datetimeFigureOut">
               <a:rPr lang="en-CA" smtClean="0"/>
-              <a:t>2020-09-12</a:t>
+              <a:t>2020-09-13</a:t>
             </a:fld>
             <a:endParaRPr lang="en-CA"/>
           </a:p>
@@ -2958,7 +2764,7 @@
           <a:p>
             <a:fld id="{3FA768BD-26DD-4A5E-93D2-95A07704EAD0}" type="datetimeFigureOut">
               <a:rPr lang="en-CA" smtClean="0"/>
-              <a:t>2020-09-12</a:t>
+              <a:t>2020-09-13</a:t>
             </a:fld>
             <a:endParaRPr lang="en-CA"/>
           </a:p>
@@ -3215,7 +3021,7 @@
           <a:p>
             <a:fld id="{3FA768BD-26DD-4A5E-93D2-95A07704EAD0}" type="datetimeFigureOut">
               <a:rPr lang="en-CA" smtClean="0"/>
-              <a:t>2020-09-12</a:t>
+              <a:t>2020-09-13</a:t>
             </a:fld>
             <a:endParaRPr lang="en-CA"/>
           </a:p>
@@ -3428,7 +3234,7 @@
           <a:p>
             <a:fld id="{3FA768BD-26DD-4A5E-93D2-95A07704EAD0}" type="datetimeFigureOut">
               <a:rPr lang="en-CA" smtClean="0"/>
-              <a:t>2020-09-12</a:t>
+              <a:t>2020-09-13</a:t>
             </a:fld>
             <a:endParaRPr lang="en-CA"/>
           </a:p>
@@ -3932,6 +3738,282 @@
 </p:sld>
 </file>
 
+<file path=ppt/slides/slide10.xml><?xml version="1.0" encoding="utf-8"?>
+<p:sld xmlns:a="http://schemas.openxmlformats.org/drawingml/2006/main" xmlns:r="http://schemas.openxmlformats.org/officeDocument/2006/relationships" xmlns:p="http://schemas.openxmlformats.org/presentationml/2006/main">
+  <p:cSld>
+    <p:bg>
+      <p:bgPr>
+        <a:solidFill>
+          <a:schemeClr val="bg1"/>
+        </a:solidFill>
+        <a:effectLst/>
+      </p:bgPr>
+    </p:bg>
+    <p:spTree>
+      <p:nvGrpSpPr>
+        <p:cNvPr id="1" name=""/>
+        <p:cNvGrpSpPr/>
+        <p:nvPr/>
+      </p:nvGrpSpPr>
+      <p:grpSpPr>
+        <a:xfrm>
+          <a:off x="0" y="0"/>
+          <a:ext cx="0" cy="0"/>
+          <a:chOff x="0" y="0"/>
+          <a:chExt cx="0" cy="0"/>
+        </a:xfrm>
+      </p:grpSpPr>
+      <p:pic>
+        <p:nvPicPr>
+          <p:cNvPr id="2" name="Picture 1">
+            <a:extLst>
+              <a:ext uri="{FF2B5EF4-FFF2-40B4-BE49-F238E27FC236}">
+                <a16:creationId xmlns:a16="http://schemas.microsoft.com/office/drawing/2014/main" id="{AF8C5A52-D693-4D31-B119-319C6909CAFF}"/>
+              </a:ext>
+            </a:extLst>
+          </p:cNvPr>
+          <p:cNvPicPr>
+            <a:picLocks noChangeAspect="1"/>
+          </p:cNvPicPr>
+          <p:nvPr/>
+        </p:nvPicPr>
+        <p:blipFill>
+          <a:blip r:embed="rId2"/>
+          <a:stretch>
+            <a:fillRect/>
+          </a:stretch>
+        </p:blipFill>
+        <p:spPr>
+          <a:xfrm>
+            <a:off x="1439914" y="114623"/>
+            <a:ext cx="6264172" cy="6628754"/>
+          </a:xfrm>
+          <a:prstGeom prst="rect">
+            <a:avLst/>
+          </a:prstGeom>
+        </p:spPr>
+      </p:pic>
+    </p:spTree>
+    <p:extLst>
+      <p:ext uri="{BB962C8B-B14F-4D97-AF65-F5344CB8AC3E}">
+        <p14:creationId xmlns:p14="http://schemas.microsoft.com/office/powerpoint/2010/main" val="2516494280"/>
+      </p:ext>
+    </p:extLst>
+  </p:cSld>
+  <p:clrMapOvr>
+    <a:masterClrMapping/>
+  </p:clrMapOvr>
+</p:sld>
+</file>
+
+<file path=ppt/slides/slide11.xml><?xml version="1.0" encoding="utf-8"?>
+<p:sld xmlns:a="http://schemas.openxmlformats.org/drawingml/2006/main" xmlns:r="http://schemas.openxmlformats.org/officeDocument/2006/relationships" xmlns:p="http://schemas.openxmlformats.org/presentationml/2006/main">
+  <p:cSld>
+    <p:spTree>
+      <p:nvGrpSpPr>
+        <p:cNvPr id="1" name=""/>
+        <p:cNvGrpSpPr/>
+        <p:nvPr/>
+      </p:nvGrpSpPr>
+      <p:grpSpPr>
+        <a:xfrm>
+          <a:off x="0" y="0"/>
+          <a:ext cx="0" cy="0"/>
+          <a:chOff x="0" y="0"/>
+          <a:chExt cx="0" cy="0"/>
+        </a:xfrm>
+      </p:grpSpPr>
+      <p:pic>
+        <p:nvPicPr>
+          <p:cNvPr id="2" name="Picture 1">
+            <a:extLst>
+              <a:ext uri="{FF2B5EF4-FFF2-40B4-BE49-F238E27FC236}">
+                <a16:creationId xmlns:a16="http://schemas.microsoft.com/office/drawing/2014/main" id="{39076E4B-CAFA-4090-86E0-E9579644C1D8}"/>
+              </a:ext>
+            </a:extLst>
+          </p:cNvPr>
+          <p:cNvPicPr>
+            <a:picLocks noChangeAspect="1"/>
+          </p:cNvPicPr>
+          <p:nvPr/>
+        </p:nvPicPr>
+        <p:blipFill>
+          <a:blip r:embed="rId2"/>
+          <a:stretch>
+            <a:fillRect/>
+          </a:stretch>
+        </p:blipFill>
+        <p:spPr>
+          <a:xfrm>
+            <a:off x="2547937" y="966787"/>
+            <a:ext cx="4048125" cy="4924425"/>
+          </a:xfrm>
+          <a:prstGeom prst="rect">
+            <a:avLst/>
+          </a:prstGeom>
+        </p:spPr>
+      </p:pic>
+    </p:spTree>
+    <p:extLst>
+      <p:ext uri="{BB962C8B-B14F-4D97-AF65-F5344CB8AC3E}">
+        <p14:creationId xmlns:p14="http://schemas.microsoft.com/office/powerpoint/2010/main" val="1705422974"/>
+      </p:ext>
+    </p:extLst>
+  </p:cSld>
+  <p:clrMapOvr>
+    <a:masterClrMapping/>
+  </p:clrMapOvr>
+</p:sld>
+</file>
+
+<file path=ppt/slides/slide12.xml><?xml version="1.0" encoding="utf-8"?>
+<p:sld xmlns:a="http://schemas.openxmlformats.org/drawingml/2006/main" xmlns:r="http://schemas.openxmlformats.org/officeDocument/2006/relationships" xmlns:p="http://schemas.openxmlformats.org/presentationml/2006/main">
+  <p:cSld>
+    <p:spTree>
+      <p:nvGrpSpPr>
+        <p:cNvPr id="1" name=""/>
+        <p:cNvGrpSpPr/>
+        <p:nvPr/>
+      </p:nvGrpSpPr>
+      <p:grpSpPr>
+        <a:xfrm>
+          <a:off x="0" y="0"/>
+          <a:ext cx="0" cy="0"/>
+          <a:chOff x="0" y="0"/>
+          <a:chExt cx="0" cy="0"/>
+        </a:xfrm>
+      </p:grpSpPr>
+      <p:pic>
+        <p:nvPicPr>
+          <p:cNvPr id="3" name="Picture 2">
+            <a:extLst>
+              <a:ext uri="{FF2B5EF4-FFF2-40B4-BE49-F238E27FC236}">
+                <a16:creationId xmlns:a16="http://schemas.microsoft.com/office/drawing/2014/main" id="{037E66A7-C268-4B8F-A5BE-D0D2F2C04093}"/>
+              </a:ext>
+            </a:extLst>
+          </p:cNvPr>
+          <p:cNvPicPr>
+            <a:picLocks noChangeAspect="1"/>
+          </p:cNvPicPr>
+          <p:nvPr/>
+        </p:nvPicPr>
+        <p:blipFill>
+          <a:blip r:embed="rId2"/>
+          <a:stretch>
+            <a:fillRect/>
+          </a:stretch>
+        </p:blipFill>
+        <p:spPr>
+          <a:xfrm>
+            <a:off x="2280584" y="1511724"/>
+            <a:ext cx="4969034" cy="3834551"/>
+          </a:xfrm>
+          <a:prstGeom prst="rect">
+            <a:avLst/>
+          </a:prstGeom>
+        </p:spPr>
+      </p:pic>
+    </p:spTree>
+    <p:extLst>
+      <p:ext uri="{BB962C8B-B14F-4D97-AF65-F5344CB8AC3E}">
+        <p14:creationId xmlns:p14="http://schemas.microsoft.com/office/powerpoint/2010/main" val="641899423"/>
+      </p:ext>
+    </p:extLst>
+  </p:cSld>
+  <p:clrMapOvr>
+    <a:masterClrMapping/>
+  </p:clrMapOvr>
+</p:sld>
+</file>
+
+<file path=ppt/slides/slide13.xml><?xml version="1.0" encoding="utf-8"?>
+<p:sld xmlns:a="http://schemas.openxmlformats.org/drawingml/2006/main" xmlns:r="http://schemas.openxmlformats.org/officeDocument/2006/relationships" xmlns:p="http://schemas.openxmlformats.org/presentationml/2006/main">
+  <p:cSld>
+    <p:spTree>
+      <p:nvGrpSpPr>
+        <p:cNvPr id="1" name=""/>
+        <p:cNvGrpSpPr/>
+        <p:nvPr/>
+      </p:nvGrpSpPr>
+      <p:grpSpPr>
+        <a:xfrm>
+          <a:off x="0" y="0"/>
+          <a:ext cx="0" cy="0"/>
+          <a:chOff x="0" y="0"/>
+          <a:chExt cx="0" cy="0"/>
+        </a:xfrm>
+      </p:grpSpPr>
+      <p:pic>
+        <p:nvPicPr>
+          <p:cNvPr id="3" name="Picture 2">
+            <a:extLst>
+              <a:ext uri="{FF2B5EF4-FFF2-40B4-BE49-F238E27FC236}">
+                <a16:creationId xmlns:a16="http://schemas.microsoft.com/office/drawing/2014/main" id="{1EF17B38-FD1F-4B7D-9AA6-9F81B57E19DB}"/>
+              </a:ext>
+            </a:extLst>
+          </p:cNvPr>
+          <p:cNvPicPr>
+            <a:picLocks noChangeAspect="1"/>
+          </p:cNvPicPr>
+          <p:nvPr/>
+        </p:nvPicPr>
+        <p:blipFill rotWithShape="1">
+          <a:blip r:embed="rId2"/>
+          <a:srcRect b="79312"/>
+          <a:stretch/>
+        </p:blipFill>
+        <p:spPr>
+          <a:xfrm>
+            <a:off x="155920" y="908810"/>
+            <a:ext cx="8832160" cy="971506"/>
+          </a:xfrm>
+          <a:prstGeom prst="rect">
+            <a:avLst/>
+          </a:prstGeom>
+        </p:spPr>
+      </p:pic>
+      <p:pic>
+        <p:nvPicPr>
+          <p:cNvPr id="4" name="Picture 3">
+            <a:extLst>
+              <a:ext uri="{FF2B5EF4-FFF2-40B4-BE49-F238E27FC236}">
+                <a16:creationId xmlns:a16="http://schemas.microsoft.com/office/drawing/2014/main" id="{37071050-EFDB-4399-93A8-A73F41541BFB}"/>
+              </a:ext>
+            </a:extLst>
+          </p:cNvPr>
+          <p:cNvPicPr>
+            <a:picLocks noChangeAspect="1"/>
+          </p:cNvPicPr>
+          <p:nvPr/>
+        </p:nvPicPr>
+        <p:blipFill rotWithShape="1">
+          <a:blip r:embed="rId2"/>
+          <a:srcRect t="20250" r="64821"/>
+          <a:stretch/>
+        </p:blipFill>
+        <p:spPr>
+          <a:xfrm>
+            <a:off x="3018490" y="2204196"/>
+            <a:ext cx="3107020" cy="3744994"/>
+          </a:xfrm>
+          <a:prstGeom prst="rect">
+            <a:avLst/>
+          </a:prstGeom>
+        </p:spPr>
+      </p:pic>
+    </p:spTree>
+    <p:extLst>
+      <p:ext uri="{BB962C8B-B14F-4D97-AF65-F5344CB8AC3E}">
+        <p14:creationId xmlns:p14="http://schemas.microsoft.com/office/powerpoint/2010/main" val="1903053995"/>
+      </p:ext>
+    </p:extLst>
+  </p:cSld>
+  <p:clrMapOvr>
+    <a:masterClrMapping/>
+  </p:clrMapOvr>
+</p:sld>
+</file>
+
 <file path=ppt/slides/slide2.xml><?xml version="1.0" encoding="utf-8"?>
 <p:sld xmlns:a="http://schemas.openxmlformats.org/drawingml/2006/main" xmlns:r="http://schemas.openxmlformats.org/officeDocument/2006/relationships" xmlns:p="http://schemas.openxmlformats.org/presentationml/2006/main">
   <p:cSld>
@@ -4130,8 +4212,8 @@
         </p:nvSpPr>
         <p:spPr>
           <a:xfrm>
-            <a:off x="1981079" y="6064689"/>
-            <a:ext cx="5181841" cy="508463"/>
+            <a:off x="1243012" y="6075136"/>
+            <a:ext cx="6061233" cy="369333"/>
           </a:xfrm>
           <a:prstGeom prst="rect">
             <a:avLst/>
@@ -4144,7 +4226,7 @@
         </p:spPr>
         <p:txBody>
           <a:bodyPr vert="horz" lIns="91440" tIns="45720" rIns="91440" bIns="45720" rtlCol="0" anchor="ctr">
-            <a:normAutofit/>
+            <a:normAutofit fontScale="70000" lnSpcReduction="20000"/>
           </a:bodyPr>
           <a:lstStyle>
             <a:lvl1pPr algn="l" defTabSz="914400" rtl="0" eaLnBrk="1" latinLnBrk="0" hangingPunct="1">
@@ -4171,7 +4253,7 @@
               <a:rPr lang="en-CA" sz="2400" dirty="0">
                 <a:latin typeface="+mn-lt"/>
               </a:rPr>
-              <a:t>Goal: Scrap condo listings in Toronto</a:t>
+              <a:t>Goal: Scrap condo listings in Toronto &amp; explore available options</a:t>
             </a:r>
           </a:p>
         </p:txBody>
@@ -4537,7 +4619,7 @@
             <a:pPr algn="ctr"/>
             <a:r>
               <a:rPr lang="en-CA" sz="3000" dirty="0"/>
-              <a:t>Future Directions</a:t>
+              <a:t>Data Structure</a:t>
             </a:r>
           </a:p>
         </p:txBody>
@@ -4583,45 +4665,66 @@
           </a:fontRef>
         </p:style>
       </p:cxnSp>
-      <p:sp>
-        <p:nvSpPr>
-          <p:cNvPr id="9" name="TextBox 8">
+      <p:pic>
+        <p:nvPicPr>
+          <p:cNvPr id="3" name="Picture 2">
             <a:extLst>
               <a:ext uri="{FF2B5EF4-FFF2-40B4-BE49-F238E27FC236}">
-                <a16:creationId xmlns:a16="http://schemas.microsoft.com/office/drawing/2014/main" id="{541B5442-A49B-413C-9394-E3065844F4B3}"/>
+                <a16:creationId xmlns:a16="http://schemas.microsoft.com/office/drawing/2014/main" id="{C49A8199-0CC4-4AAE-9866-3818B4CA288D}"/>
               </a:ext>
             </a:extLst>
           </p:cNvPr>
-          <p:cNvSpPr txBox="1"/>
+          <p:cNvPicPr>
+            <a:picLocks noChangeAspect="1"/>
+          </p:cNvPicPr>
           <p:nvPr/>
-        </p:nvSpPr>
+        </p:nvPicPr>
+        <p:blipFill>
+          <a:blip r:embed="rId3"/>
+          <a:stretch>
+            <a:fillRect/>
+          </a:stretch>
+        </p:blipFill>
         <p:spPr>
           <a:xfrm>
-            <a:off x="1057276" y="1244069"/>
-            <a:ext cx="3328987" cy="369332"/>
+            <a:off x="2341059" y="841962"/>
+            <a:ext cx="3790950" cy="4457700"/>
           </a:xfrm>
           <a:prstGeom prst="rect">
             <a:avLst/>
           </a:prstGeom>
-          <a:noFill/>
         </p:spPr>
-        <p:txBody>
-          <a:bodyPr wrap="square" rtlCol="0">
-            <a:spAutoFit/>
-          </a:bodyPr>
-          <a:lstStyle/>
-          <a:p>
-            <a:pPr marL="285750" indent="-285750">
-              <a:buFont typeface="Arial" panose="020B0604020202020204" pitchFamily="34" charset="0"/>
-              <a:buChar char="•"/>
-            </a:pPr>
-            <a:r>
-              <a:rPr lang="en-CA" dirty="0"/>
-              <a:t>A</a:t>
-            </a:r>
-          </a:p>
-        </p:txBody>
-      </p:sp>
+      </p:pic>
+      <p:pic>
+        <p:nvPicPr>
+          <p:cNvPr id="4" name="Picture 3">
+            <a:extLst>
+              <a:ext uri="{FF2B5EF4-FFF2-40B4-BE49-F238E27FC236}">
+                <a16:creationId xmlns:a16="http://schemas.microsoft.com/office/drawing/2014/main" id="{32581AD5-AC26-4FFE-A636-0A45D6BA1098}"/>
+              </a:ext>
+            </a:extLst>
+          </p:cNvPr>
+          <p:cNvPicPr>
+            <a:picLocks noChangeAspect="1"/>
+          </p:cNvPicPr>
+          <p:nvPr/>
+        </p:nvPicPr>
+        <p:blipFill>
+          <a:blip r:embed="rId4"/>
+          <a:stretch>
+            <a:fillRect/>
+          </a:stretch>
+        </p:blipFill>
+        <p:spPr>
+          <a:xfrm>
+            <a:off x="2341059" y="5612994"/>
+            <a:ext cx="2076450" cy="619125"/>
+          </a:xfrm>
+          <a:prstGeom prst="rect">
+            <a:avLst/>
+          </a:prstGeom>
+        </p:spPr>
+      </p:pic>
     </p:spTree>
     <p:extLst>
       <p:ext uri="{BB962C8B-B14F-4D97-AF65-F5344CB8AC3E}">
@@ -4632,6 +4735,2488 @@
   <p:clrMapOvr>
     <a:masterClrMapping/>
   </p:clrMapOvr>
+</p:sld>
+</file>
+
+<file path=ppt/slides/slide5.xml><?xml version="1.0" encoding="utf-8"?>
+<p:sld xmlns:a="http://schemas.openxmlformats.org/drawingml/2006/main" xmlns:r="http://schemas.openxmlformats.org/officeDocument/2006/relationships" xmlns:p="http://schemas.openxmlformats.org/presentationml/2006/main">
+  <p:cSld>
+    <p:spTree>
+      <p:nvGrpSpPr>
+        <p:cNvPr id="1" name=""/>
+        <p:cNvGrpSpPr/>
+        <p:nvPr/>
+      </p:nvGrpSpPr>
+      <p:grpSpPr>
+        <a:xfrm>
+          <a:off x="0" y="0"/>
+          <a:ext cx="0" cy="0"/>
+          <a:chOff x="0" y="0"/>
+          <a:chExt cx="0" cy="0"/>
+        </a:xfrm>
+      </p:grpSpPr>
+      <p:sp>
+        <p:nvSpPr>
+          <p:cNvPr id="2" name="Title 1">
+            <a:extLst>
+              <a:ext uri="{FF2B5EF4-FFF2-40B4-BE49-F238E27FC236}">
+                <a16:creationId xmlns:a16="http://schemas.microsoft.com/office/drawing/2014/main" id="{C87D5EBE-5D8F-4C06-92CC-44DA5E4A8C06}"/>
+              </a:ext>
+            </a:extLst>
+          </p:cNvPr>
+          <p:cNvSpPr>
+            <a:spLocks noGrp="1"/>
+          </p:cNvSpPr>
+          <p:nvPr>
+            <p:ph type="title"/>
+          </p:nvPr>
+        </p:nvSpPr>
+        <p:spPr>
+          <a:xfrm>
+            <a:off x="628650" y="954087"/>
+            <a:ext cx="7886700" cy="1325563"/>
+          </a:xfrm>
+        </p:spPr>
+        <p:txBody>
+          <a:bodyPr/>
+          <a:lstStyle/>
+          <a:p>
+            <a:endParaRPr lang="en-CA" dirty="0"/>
+          </a:p>
+        </p:txBody>
+      </p:sp>
+      <p:grpSp>
+        <p:nvGrpSpPr>
+          <p:cNvPr id="3" name="Group 2">
+            <a:extLst>
+              <a:ext uri="{FF2B5EF4-FFF2-40B4-BE49-F238E27FC236}">
+                <a16:creationId xmlns:a16="http://schemas.microsoft.com/office/drawing/2014/main" id="{AE93098D-D6C5-4FFB-B05C-413E71F98249}"/>
+              </a:ext>
+            </a:extLst>
+          </p:cNvPr>
+          <p:cNvGrpSpPr/>
+          <p:nvPr/>
+        </p:nvGrpSpPr>
+        <p:grpSpPr>
+          <a:xfrm>
+            <a:off x="373599" y="954087"/>
+            <a:ext cx="8396801" cy="4985402"/>
+            <a:chOff x="0" y="1996357"/>
+            <a:chExt cx="9144000" cy="5429036"/>
+          </a:xfrm>
+        </p:grpSpPr>
+        <p:pic>
+          <p:nvPicPr>
+            <p:cNvPr id="4" name="Picture 3">
+              <a:extLst>
+                <a:ext uri="{FF2B5EF4-FFF2-40B4-BE49-F238E27FC236}">
+                  <a16:creationId xmlns:a16="http://schemas.microsoft.com/office/drawing/2014/main" id="{0B677AB0-1688-4490-A6CA-B3DE1358D215}"/>
+                </a:ext>
+              </a:extLst>
+            </p:cNvPr>
+            <p:cNvPicPr>
+              <a:picLocks noChangeAspect="1"/>
+            </p:cNvPicPr>
+            <p:nvPr/>
+          </p:nvPicPr>
+          <p:blipFill>
+            <a:blip r:embed="rId2"/>
+            <a:stretch>
+              <a:fillRect/>
+            </a:stretch>
+          </p:blipFill>
+          <p:spPr>
+            <a:xfrm>
+              <a:off x="108974" y="4954406"/>
+              <a:ext cx="7579922" cy="2470987"/>
+            </a:xfrm>
+            <a:prstGeom prst="rect">
+              <a:avLst/>
+            </a:prstGeom>
+          </p:spPr>
+        </p:pic>
+        <p:pic>
+          <p:nvPicPr>
+            <p:cNvPr id="5" name="Picture 4">
+              <a:extLst>
+                <a:ext uri="{FF2B5EF4-FFF2-40B4-BE49-F238E27FC236}">
+                  <a16:creationId xmlns:a16="http://schemas.microsoft.com/office/drawing/2014/main" id="{5282A2FE-6CCD-4553-ADCC-530527BBCAA3}"/>
+                </a:ext>
+              </a:extLst>
+            </p:cNvPr>
+            <p:cNvPicPr>
+              <a:picLocks noChangeAspect="1"/>
+            </p:cNvPicPr>
+            <p:nvPr/>
+          </p:nvPicPr>
+          <p:blipFill>
+            <a:blip r:embed="rId3"/>
+            <a:stretch>
+              <a:fillRect/>
+            </a:stretch>
+          </p:blipFill>
+          <p:spPr>
+            <a:xfrm>
+              <a:off x="0" y="1996357"/>
+              <a:ext cx="9144000" cy="2865286"/>
+            </a:xfrm>
+            <a:prstGeom prst="rect">
+              <a:avLst/>
+            </a:prstGeom>
+          </p:spPr>
+        </p:pic>
+      </p:grpSp>
+      <p:grpSp>
+        <p:nvGrpSpPr>
+          <p:cNvPr id="17" name="Group 16">
+            <a:extLst>
+              <a:ext uri="{FF2B5EF4-FFF2-40B4-BE49-F238E27FC236}">
+                <a16:creationId xmlns:a16="http://schemas.microsoft.com/office/drawing/2014/main" id="{56842345-D00F-4F6E-8933-CF77E71962D9}"/>
+              </a:ext>
+            </a:extLst>
+          </p:cNvPr>
+          <p:cNvGrpSpPr/>
+          <p:nvPr/>
+        </p:nvGrpSpPr>
+        <p:grpSpPr>
+          <a:xfrm>
+            <a:off x="2801073" y="1376039"/>
+            <a:ext cx="5324355" cy="4563450"/>
+            <a:chOff x="2801073" y="787078"/>
+            <a:chExt cx="5324355" cy="4563450"/>
+          </a:xfrm>
+        </p:grpSpPr>
+        <p:sp>
+          <p:nvSpPr>
+            <p:cNvPr id="6" name="Rectangle 5">
+              <a:extLst>
+                <a:ext uri="{FF2B5EF4-FFF2-40B4-BE49-F238E27FC236}">
+                  <a16:creationId xmlns:a16="http://schemas.microsoft.com/office/drawing/2014/main" id="{ED538DD6-B1E3-496C-ADF7-AB8B9A6898D2}"/>
+                </a:ext>
+              </a:extLst>
+            </p:cNvPr>
+            <p:cNvSpPr/>
+            <p:nvPr/>
+          </p:nvSpPr>
+          <p:spPr>
+            <a:xfrm>
+              <a:off x="3194613" y="787078"/>
+              <a:ext cx="1377387" cy="2176041"/>
+            </a:xfrm>
+            <a:prstGeom prst="rect">
+              <a:avLst/>
+            </a:prstGeom>
+            <a:noFill/>
+            <a:ln w="28575">
+              <a:solidFill>
+                <a:srgbClr val="C00000"/>
+              </a:solidFill>
+            </a:ln>
+          </p:spPr>
+          <p:style>
+            <a:lnRef idx="2">
+              <a:schemeClr val="accent1">
+                <a:shade val="50000"/>
+              </a:schemeClr>
+            </a:lnRef>
+            <a:fillRef idx="1">
+              <a:schemeClr val="accent1"/>
+            </a:fillRef>
+            <a:effectRef idx="0">
+              <a:schemeClr val="accent1"/>
+            </a:effectRef>
+            <a:fontRef idx="minor">
+              <a:schemeClr val="lt1"/>
+            </a:fontRef>
+          </p:style>
+          <p:txBody>
+            <a:bodyPr rtlCol="0" anchor="ctr"/>
+            <a:lstStyle/>
+            <a:p>
+              <a:pPr algn="ctr"/>
+              <a:endParaRPr lang="en-CA"/>
+            </a:p>
+          </p:txBody>
+        </p:sp>
+        <p:sp>
+          <p:nvSpPr>
+            <p:cNvPr id="8" name="Rectangle 7">
+              <a:extLst>
+                <a:ext uri="{FF2B5EF4-FFF2-40B4-BE49-F238E27FC236}">
+                  <a16:creationId xmlns:a16="http://schemas.microsoft.com/office/drawing/2014/main" id="{48896731-36EF-4194-AC7A-A30C1C1F8950}"/>
+                </a:ext>
+              </a:extLst>
+            </p:cNvPr>
+            <p:cNvSpPr/>
+            <p:nvPr/>
+          </p:nvSpPr>
+          <p:spPr>
+            <a:xfrm>
+              <a:off x="7720314" y="787078"/>
+              <a:ext cx="405114" cy="2176041"/>
+            </a:xfrm>
+            <a:prstGeom prst="rect">
+              <a:avLst/>
+            </a:prstGeom>
+            <a:noFill/>
+            <a:ln w="28575">
+              <a:solidFill>
+                <a:srgbClr val="C00000"/>
+              </a:solidFill>
+            </a:ln>
+          </p:spPr>
+          <p:style>
+            <a:lnRef idx="2">
+              <a:schemeClr val="accent1">
+                <a:shade val="50000"/>
+              </a:schemeClr>
+            </a:lnRef>
+            <a:fillRef idx="1">
+              <a:schemeClr val="accent1"/>
+            </a:fillRef>
+            <a:effectRef idx="0">
+              <a:schemeClr val="accent1"/>
+            </a:effectRef>
+            <a:fontRef idx="minor">
+              <a:schemeClr val="lt1"/>
+            </a:fontRef>
+          </p:style>
+          <p:txBody>
+            <a:bodyPr rtlCol="0" anchor="ctr"/>
+            <a:lstStyle/>
+            <a:p>
+              <a:pPr algn="ctr"/>
+              <a:endParaRPr lang="en-CA"/>
+            </a:p>
+          </p:txBody>
+        </p:sp>
+        <p:sp>
+          <p:nvSpPr>
+            <p:cNvPr id="12" name="Rectangle 11">
+              <a:extLst>
+                <a:ext uri="{FF2B5EF4-FFF2-40B4-BE49-F238E27FC236}">
+                  <a16:creationId xmlns:a16="http://schemas.microsoft.com/office/drawing/2014/main" id="{ABAD5E39-410B-49BD-AAF8-8FBBE5DF71CD}"/>
+                </a:ext>
+              </a:extLst>
+            </p:cNvPr>
+            <p:cNvSpPr/>
+            <p:nvPr/>
+          </p:nvSpPr>
+          <p:spPr>
+            <a:xfrm>
+              <a:off x="2801073" y="3081458"/>
+              <a:ext cx="914399" cy="2269070"/>
+            </a:xfrm>
+            <a:prstGeom prst="rect">
+              <a:avLst/>
+            </a:prstGeom>
+            <a:noFill/>
+            <a:ln w="28575">
+              <a:solidFill>
+                <a:srgbClr val="C00000"/>
+              </a:solidFill>
+            </a:ln>
+          </p:spPr>
+          <p:style>
+            <a:lnRef idx="2">
+              <a:schemeClr val="accent1">
+                <a:shade val="50000"/>
+              </a:schemeClr>
+            </a:lnRef>
+            <a:fillRef idx="1">
+              <a:schemeClr val="accent1"/>
+            </a:fillRef>
+            <a:effectRef idx="0">
+              <a:schemeClr val="accent1"/>
+            </a:effectRef>
+            <a:fontRef idx="minor">
+              <a:schemeClr val="lt1"/>
+            </a:fontRef>
+          </p:style>
+          <p:txBody>
+            <a:bodyPr rtlCol="0" anchor="ctr"/>
+            <a:lstStyle/>
+            <a:p>
+              <a:pPr algn="ctr"/>
+              <a:endParaRPr lang="en-CA"/>
+            </a:p>
+          </p:txBody>
+        </p:sp>
+      </p:grpSp>
+      <p:grpSp>
+        <p:nvGrpSpPr>
+          <p:cNvPr id="18" name="Group 17">
+            <a:extLst>
+              <a:ext uri="{FF2B5EF4-FFF2-40B4-BE49-F238E27FC236}">
+                <a16:creationId xmlns:a16="http://schemas.microsoft.com/office/drawing/2014/main" id="{82A2D373-3024-493F-AB27-FF28E833DF83}"/>
+              </a:ext>
+            </a:extLst>
+          </p:cNvPr>
+          <p:cNvGrpSpPr/>
+          <p:nvPr/>
+        </p:nvGrpSpPr>
+        <p:grpSpPr>
+          <a:xfrm>
+            <a:off x="3859548" y="1044910"/>
+            <a:ext cx="4973808" cy="5425859"/>
+            <a:chOff x="3859548" y="455949"/>
+            <a:chExt cx="4973808" cy="5425859"/>
+          </a:xfrm>
+        </p:grpSpPr>
+        <p:pic>
+          <p:nvPicPr>
+            <p:cNvPr id="14" name="Picture 13">
+              <a:extLst>
+                <a:ext uri="{FF2B5EF4-FFF2-40B4-BE49-F238E27FC236}">
+                  <a16:creationId xmlns:a16="http://schemas.microsoft.com/office/drawing/2014/main" id="{8203199B-F170-450A-92B9-39B62B4B7F0F}"/>
+                </a:ext>
+              </a:extLst>
+            </p:cNvPr>
+            <p:cNvPicPr>
+              <a:picLocks noChangeAspect="1"/>
+            </p:cNvPicPr>
+            <p:nvPr/>
+          </p:nvPicPr>
+          <p:blipFill>
+            <a:blip r:embed="rId4"/>
+            <a:stretch>
+              <a:fillRect/>
+            </a:stretch>
+          </p:blipFill>
+          <p:spPr>
+            <a:xfrm>
+              <a:off x="4708190" y="455949"/>
+              <a:ext cx="1838325" cy="2895600"/>
+            </a:xfrm>
+            <a:prstGeom prst="rect">
+              <a:avLst/>
+            </a:prstGeom>
+            <a:ln w="57150">
+              <a:solidFill>
+                <a:srgbClr val="C00000"/>
+              </a:solidFill>
+            </a:ln>
+          </p:spPr>
+        </p:pic>
+        <p:pic>
+          <p:nvPicPr>
+            <p:cNvPr id="15" name="Picture 14">
+              <a:extLst>
+                <a:ext uri="{FF2B5EF4-FFF2-40B4-BE49-F238E27FC236}">
+                  <a16:creationId xmlns:a16="http://schemas.microsoft.com/office/drawing/2014/main" id="{26A822D7-4E25-45BD-A8D9-9C5C136D7256}"/>
+                </a:ext>
+              </a:extLst>
+            </p:cNvPr>
+            <p:cNvPicPr>
+              <a:picLocks noChangeAspect="1"/>
+            </p:cNvPicPr>
+            <p:nvPr/>
+          </p:nvPicPr>
+          <p:blipFill>
+            <a:blip r:embed="rId5"/>
+            <a:stretch>
+              <a:fillRect/>
+            </a:stretch>
+          </p:blipFill>
+          <p:spPr>
+            <a:xfrm>
+              <a:off x="8321800" y="787078"/>
+              <a:ext cx="511556" cy="2895600"/>
+            </a:xfrm>
+            <a:prstGeom prst="rect">
+              <a:avLst/>
+            </a:prstGeom>
+            <a:ln w="57150">
+              <a:solidFill>
+                <a:srgbClr val="C00000"/>
+              </a:solidFill>
+            </a:ln>
+          </p:spPr>
+        </p:pic>
+        <p:pic>
+          <p:nvPicPr>
+            <p:cNvPr id="16" name="Picture 15">
+              <a:extLst>
+                <a:ext uri="{FF2B5EF4-FFF2-40B4-BE49-F238E27FC236}">
+                  <a16:creationId xmlns:a16="http://schemas.microsoft.com/office/drawing/2014/main" id="{9816F73A-54C2-440D-B6C5-DC2FA34EBFE9}"/>
+                </a:ext>
+              </a:extLst>
+            </p:cNvPr>
+            <p:cNvPicPr>
+              <a:picLocks noChangeAspect="1"/>
+            </p:cNvPicPr>
+            <p:nvPr/>
+          </p:nvPicPr>
+          <p:blipFill>
+            <a:blip r:embed="rId6"/>
+            <a:stretch>
+              <a:fillRect/>
+            </a:stretch>
+          </p:blipFill>
+          <p:spPr>
+            <a:xfrm>
+              <a:off x="3859548" y="3081458"/>
+              <a:ext cx="1152525" cy="2800350"/>
+            </a:xfrm>
+            <a:prstGeom prst="rect">
+              <a:avLst/>
+            </a:prstGeom>
+            <a:ln w="57150">
+              <a:solidFill>
+                <a:srgbClr val="C00000"/>
+              </a:solidFill>
+            </a:ln>
+          </p:spPr>
+        </p:pic>
+      </p:grpSp>
+      <p:sp>
+        <p:nvSpPr>
+          <p:cNvPr id="19" name="TextBox 18">
+            <a:extLst>
+              <a:ext uri="{FF2B5EF4-FFF2-40B4-BE49-F238E27FC236}">
+                <a16:creationId xmlns:a16="http://schemas.microsoft.com/office/drawing/2014/main" id="{CFB3FA83-B7DD-4ACD-8560-02664800F454}"/>
+              </a:ext>
+            </a:extLst>
+          </p:cNvPr>
+          <p:cNvSpPr txBox="1"/>
+          <p:nvPr/>
+        </p:nvSpPr>
+        <p:spPr>
+          <a:xfrm>
+            <a:off x="5441413" y="6286103"/>
+            <a:ext cx="3328987" cy="338554"/>
+          </a:xfrm>
+          <a:prstGeom prst="rect">
+            <a:avLst/>
+          </a:prstGeom>
+          <a:noFill/>
+        </p:spPr>
+        <p:txBody>
+          <a:bodyPr wrap="square" rtlCol="0">
+            <a:spAutoFit/>
+          </a:bodyPr>
+          <a:lstStyle/>
+          <a:p>
+            <a:pPr marL="285750" indent="-285750">
+              <a:buFont typeface="Arial" panose="020B0604020202020204" pitchFamily="34" charset="0"/>
+              <a:buChar char="•"/>
+            </a:pPr>
+            <a:r>
+              <a:rPr lang="en-CA" sz="1600" dirty="0"/>
+              <a:t>Changed to float64</a:t>
+            </a:r>
+          </a:p>
+        </p:txBody>
+      </p:sp>
+      <p:sp>
+        <p:nvSpPr>
+          <p:cNvPr id="20" name="Title 7">
+            <a:extLst>
+              <a:ext uri="{FF2B5EF4-FFF2-40B4-BE49-F238E27FC236}">
+                <a16:creationId xmlns:a16="http://schemas.microsoft.com/office/drawing/2014/main" id="{AA162CED-38D1-4CF9-8086-70035B9501FB}"/>
+              </a:ext>
+            </a:extLst>
+          </p:cNvPr>
+          <p:cNvSpPr txBox="1">
+            <a:spLocks/>
+          </p:cNvSpPr>
+          <p:nvPr/>
+        </p:nvSpPr>
+        <p:spPr>
+          <a:xfrm>
+            <a:off x="628650" y="-371476"/>
+            <a:ext cx="7886700" cy="1325563"/>
+          </a:xfrm>
+          <a:prstGeom prst="rect">
+            <a:avLst/>
+          </a:prstGeom>
+        </p:spPr>
+        <p:txBody>
+          <a:bodyPr vert="horz" lIns="91440" tIns="45720" rIns="91440" bIns="45720" rtlCol="0" anchor="ctr">
+            <a:normAutofit/>
+          </a:bodyPr>
+          <a:lstStyle>
+            <a:lvl1pPr algn="l" defTabSz="914400" rtl="0" eaLnBrk="1" latinLnBrk="0" hangingPunct="1">
+              <a:lnSpc>
+                <a:spcPct val="90000"/>
+              </a:lnSpc>
+              <a:spcBef>
+                <a:spcPct val="0"/>
+              </a:spcBef>
+              <a:buNone/>
+              <a:defRPr sz="4400" kern="1200">
+                <a:solidFill>
+                  <a:schemeClr val="tx1"/>
+                </a:solidFill>
+                <a:latin typeface="+mj-lt"/>
+                <a:ea typeface="+mj-ea"/>
+                <a:cs typeface="+mj-cs"/>
+              </a:defRPr>
+            </a:lvl1pPr>
+          </a:lstStyle>
+          <a:p>
+            <a:pPr algn="ctr"/>
+            <a:r>
+              <a:rPr lang="en-CA" sz="3000" dirty="0"/>
+              <a:t>Data Cleaning</a:t>
+            </a:r>
+          </a:p>
+        </p:txBody>
+      </p:sp>
+      <p:cxnSp>
+        <p:nvCxnSpPr>
+          <p:cNvPr id="21" name="Straight Connector 20">
+            <a:extLst>
+              <a:ext uri="{FF2B5EF4-FFF2-40B4-BE49-F238E27FC236}">
+                <a16:creationId xmlns:a16="http://schemas.microsoft.com/office/drawing/2014/main" id="{265EEE6F-7AC0-4278-9C95-EA3EB290E133}"/>
+              </a:ext>
+            </a:extLst>
+          </p:cNvPr>
+          <p:cNvCxnSpPr/>
+          <p:nvPr/>
+        </p:nvCxnSpPr>
+        <p:spPr>
+          <a:xfrm>
+            <a:off x="0" y="528629"/>
+            <a:ext cx="9144000" cy="0"/>
+          </a:xfrm>
+          <a:prstGeom prst="line">
+            <a:avLst/>
+          </a:prstGeom>
+          <a:ln w="19050">
+            <a:solidFill>
+              <a:schemeClr val="tx1"/>
+            </a:solidFill>
+          </a:ln>
+        </p:spPr>
+        <p:style>
+          <a:lnRef idx="1">
+            <a:schemeClr val="accent1"/>
+          </a:lnRef>
+          <a:fillRef idx="0">
+            <a:schemeClr val="accent1"/>
+          </a:fillRef>
+          <a:effectRef idx="0">
+            <a:schemeClr val="accent1"/>
+          </a:effectRef>
+          <a:fontRef idx="minor">
+            <a:schemeClr val="tx1"/>
+          </a:fontRef>
+        </p:style>
+      </p:cxnSp>
+    </p:spTree>
+    <p:extLst>
+      <p:ext uri="{BB962C8B-B14F-4D97-AF65-F5344CB8AC3E}">
+        <p14:creationId xmlns:p14="http://schemas.microsoft.com/office/powerpoint/2010/main" val="1561587101"/>
+      </p:ext>
+    </p:extLst>
+  </p:cSld>
+  <p:clrMapOvr>
+    <a:masterClrMapping/>
+  </p:clrMapOvr>
+  <p:timing>
+    <p:tnLst>
+      <p:par>
+        <p:cTn id="1" dur="indefinite" restart="never" nodeType="tmRoot">
+          <p:childTnLst>
+            <p:seq concurrent="1" nextAc="seek">
+              <p:cTn id="2" dur="indefinite" nodeType="mainSeq">
+                <p:childTnLst>
+                  <p:par>
+                    <p:cTn id="3" fill="hold">
+                      <p:stCondLst>
+                        <p:cond delay="indefinite"/>
+                      </p:stCondLst>
+                      <p:childTnLst>
+                        <p:par>
+                          <p:cTn id="4" fill="hold">
+                            <p:stCondLst>
+                              <p:cond delay="0"/>
+                            </p:stCondLst>
+                            <p:childTnLst>
+                              <p:par>
+                                <p:cTn id="5" presetID="1" presetClass="entr" presetSubtype="0" fill="hold" nodeType="clickEffect">
+                                  <p:stCondLst>
+                                    <p:cond delay="0"/>
+                                  </p:stCondLst>
+                                  <p:childTnLst>
+                                    <p:set>
+                                      <p:cBhvr>
+                                        <p:cTn id="6" dur="1" fill="hold">
+                                          <p:stCondLst>
+                                            <p:cond delay="0"/>
+                                          </p:stCondLst>
+                                        </p:cTn>
+                                        <p:tgtEl>
+                                          <p:spTgt spid="17"/>
+                                        </p:tgtEl>
+                                        <p:attrNameLst>
+                                          <p:attrName>style.visibility</p:attrName>
+                                        </p:attrNameLst>
+                                      </p:cBhvr>
+                                      <p:to>
+                                        <p:strVal val="visible"/>
+                                      </p:to>
+                                    </p:set>
+                                  </p:childTnLst>
+                                </p:cTn>
+                              </p:par>
+                            </p:childTnLst>
+                          </p:cTn>
+                        </p:par>
+                      </p:childTnLst>
+                    </p:cTn>
+                  </p:par>
+                  <p:par>
+                    <p:cTn id="7" fill="hold">
+                      <p:stCondLst>
+                        <p:cond delay="indefinite"/>
+                      </p:stCondLst>
+                      <p:childTnLst>
+                        <p:par>
+                          <p:cTn id="8" fill="hold">
+                            <p:stCondLst>
+                              <p:cond delay="0"/>
+                            </p:stCondLst>
+                            <p:childTnLst>
+                              <p:par>
+                                <p:cTn id="9" presetID="1" presetClass="entr" presetSubtype="0" fill="hold" nodeType="clickEffect">
+                                  <p:stCondLst>
+                                    <p:cond delay="0"/>
+                                  </p:stCondLst>
+                                  <p:childTnLst>
+                                    <p:set>
+                                      <p:cBhvr>
+                                        <p:cTn id="10" dur="1" fill="hold">
+                                          <p:stCondLst>
+                                            <p:cond delay="0"/>
+                                          </p:stCondLst>
+                                        </p:cTn>
+                                        <p:tgtEl>
+                                          <p:spTgt spid="18"/>
+                                        </p:tgtEl>
+                                        <p:attrNameLst>
+                                          <p:attrName>style.visibility</p:attrName>
+                                        </p:attrNameLst>
+                                      </p:cBhvr>
+                                      <p:to>
+                                        <p:strVal val="visible"/>
+                                      </p:to>
+                                    </p:set>
+                                  </p:childTnLst>
+                                </p:cTn>
+                              </p:par>
+                            </p:childTnLst>
+                          </p:cTn>
+                        </p:par>
+                      </p:childTnLst>
+                    </p:cTn>
+                  </p:par>
+                </p:childTnLst>
+              </p:cTn>
+              <p:prevCondLst>
+                <p:cond evt="onPrev" delay="0">
+                  <p:tgtEl>
+                    <p:sldTgt/>
+                  </p:tgtEl>
+                </p:cond>
+              </p:prevCondLst>
+              <p:nextCondLst>
+                <p:cond evt="onNext" delay="0">
+                  <p:tgtEl>
+                    <p:sldTgt/>
+                  </p:tgtEl>
+                </p:cond>
+              </p:nextCondLst>
+            </p:seq>
+          </p:childTnLst>
+        </p:cTn>
+      </p:par>
+    </p:tnLst>
+  </p:timing>
+</p:sld>
+</file>
+
+<file path=ppt/slides/slide6.xml><?xml version="1.0" encoding="utf-8"?>
+<p:sld xmlns:a="http://schemas.openxmlformats.org/drawingml/2006/main" xmlns:r="http://schemas.openxmlformats.org/officeDocument/2006/relationships" xmlns:p="http://schemas.openxmlformats.org/presentationml/2006/main">
+  <p:cSld>
+    <p:spTree>
+      <p:nvGrpSpPr>
+        <p:cNvPr id="1" name=""/>
+        <p:cNvGrpSpPr/>
+        <p:nvPr/>
+      </p:nvGrpSpPr>
+      <p:grpSpPr>
+        <a:xfrm>
+          <a:off x="0" y="0"/>
+          <a:ext cx="0" cy="0"/>
+          <a:chOff x="0" y="0"/>
+          <a:chExt cx="0" cy="0"/>
+        </a:xfrm>
+      </p:grpSpPr>
+      <p:sp>
+        <p:nvSpPr>
+          <p:cNvPr id="2" name="Title 1">
+            <a:extLst>
+              <a:ext uri="{FF2B5EF4-FFF2-40B4-BE49-F238E27FC236}">
+                <a16:creationId xmlns:a16="http://schemas.microsoft.com/office/drawing/2014/main" id="{C87D5EBE-5D8F-4C06-92CC-44DA5E4A8C06}"/>
+              </a:ext>
+            </a:extLst>
+          </p:cNvPr>
+          <p:cNvSpPr>
+            <a:spLocks noGrp="1"/>
+          </p:cNvSpPr>
+          <p:nvPr>
+            <p:ph type="title"/>
+          </p:nvPr>
+        </p:nvSpPr>
+        <p:spPr>
+          <a:xfrm>
+            <a:off x="628650" y="954087"/>
+            <a:ext cx="7886700" cy="1325563"/>
+          </a:xfrm>
+        </p:spPr>
+        <p:txBody>
+          <a:bodyPr/>
+          <a:lstStyle/>
+          <a:p>
+            <a:endParaRPr lang="en-CA" dirty="0"/>
+          </a:p>
+        </p:txBody>
+      </p:sp>
+      <p:grpSp>
+        <p:nvGrpSpPr>
+          <p:cNvPr id="3" name="Group 2">
+            <a:extLst>
+              <a:ext uri="{FF2B5EF4-FFF2-40B4-BE49-F238E27FC236}">
+                <a16:creationId xmlns:a16="http://schemas.microsoft.com/office/drawing/2014/main" id="{AE93098D-D6C5-4FFB-B05C-413E71F98249}"/>
+              </a:ext>
+            </a:extLst>
+          </p:cNvPr>
+          <p:cNvGrpSpPr/>
+          <p:nvPr/>
+        </p:nvGrpSpPr>
+        <p:grpSpPr>
+          <a:xfrm>
+            <a:off x="373599" y="954087"/>
+            <a:ext cx="8396801" cy="4985402"/>
+            <a:chOff x="0" y="1996357"/>
+            <a:chExt cx="9144000" cy="5429036"/>
+          </a:xfrm>
+        </p:grpSpPr>
+        <p:pic>
+          <p:nvPicPr>
+            <p:cNvPr id="4" name="Picture 3">
+              <a:extLst>
+                <a:ext uri="{FF2B5EF4-FFF2-40B4-BE49-F238E27FC236}">
+                  <a16:creationId xmlns:a16="http://schemas.microsoft.com/office/drawing/2014/main" id="{0B677AB0-1688-4490-A6CA-B3DE1358D215}"/>
+                </a:ext>
+              </a:extLst>
+            </p:cNvPr>
+            <p:cNvPicPr>
+              <a:picLocks noChangeAspect="1"/>
+            </p:cNvPicPr>
+            <p:nvPr/>
+          </p:nvPicPr>
+          <p:blipFill>
+            <a:blip r:embed="rId2"/>
+            <a:stretch>
+              <a:fillRect/>
+            </a:stretch>
+          </p:blipFill>
+          <p:spPr>
+            <a:xfrm>
+              <a:off x="108974" y="4954406"/>
+              <a:ext cx="7579922" cy="2470987"/>
+            </a:xfrm>
+            <a:prstGeom prst="rect">
+              <a:avLst/>
+            </a:prstGeom>
+          </p:spPr>
+        </p:pic>
+        <p:pic>
+          <p:nvPicPr>
+            <p:cNvPr id="5" name="Picture 4">
+              <a:extLst>
+                <a:ext uri="{FF2B5EF4-FFF2-40B4-BE49-F238E27FC236}">
+                  <a16:creationId xmlns:a16="http://schemas.microsoft.com/office/drawing/2014/main" id="{5282A2FE-6CCD-4553-ADCC-530527BBCAA3}"/>
+                </a:ext>
+              </a:extLst>
+            </p:cNvPr>
+            <p:cNvPicPr>
+              <a:picLocks noChangeAspect="1"/>
+            </p:cNvPicPr>
+            <p:nvPr/>
+          </p:nvPicPr>
+          <p:blipFill>
+            <a:blip r:embed="rId3"/>
+            <a:stretch>
+              <a:fillRect/>
+            </a:stretch>
+          </p:blipFill>
+          <p:spPr>
+            <a:xfrm>
+              <a:off x="0" y="1996357"/>
+              <a:ext cx="9144000" cy="2865286"/>
+            </a:xfrm>
+            <a:prstGeom prst="rect">
+              <a:avLst/>
+            </a:prstGeom>
+          </p:spPr>
+        </p:pic>
+      </p:grpSp>
+      <p:grpSp>
+        <p:nvGrpSpPr>
+          <p:cNvPr id="17" name="Group 16">
+            <a:extLst>
+              <a:ext uri="{FF2B5EF4-FFF2-40B4-BE49-F238E27FC236}">
+                <a16:creationId xmlns:a16="http://schemas.microsoft.com/office/drawing/2014/main" id="{56842345-D00F-4F6E-8933-CF77E71962D9}"/>
+              </a:ext>
+            </a:extLst>
+          </p:cNvPr>
+          <p:cNvGrpSpPr/>
+          <p:nvPr/>
+        </p:nvGrpSpPr>
+        <p:grpSpPr>
+          <a:xfrm>
+            <a:off x="4499110" y="1658076"/>
+            <a:ext cx="3244353" cy="1858428"/>
+            <a:chOff x="2400636" y="1104691"/>
+            <a:chExt cx="3244353" cy="1858428"/>
+          </a:xfrm>
+        </p:grpSpPr>
+        <p:sp>
+          <p:nvSpPr>
+            <p:cNvPr id="6" name="Rectangle 5">
+              <a:extLst>
+                <a:ext uri="{FF2B5EF4-FFF2-40B4-BE49-F238E27FC236}">
+                  <a16:creationId xmlns:a16="http://schemas.microsoft.com/office/drawing/2014/main" id="{ED538DD6-B1E3-496C-ADF7-AB8B9A6898D2}"/>
+                </a:ext>
+              </a:extLst>
+            </p:cNvPr>
+            <p:cNvSpPr/>
+            <p:nvPr/>
+          </p:nvSpPr>
+          <p:spPr>
+            <a:xfrm>
+              <a:off x="3480523" y="1104691"/>
+              <a:ext cx="2164466" cy="1858428"/>
+            </a:xfrm>
+            <a:prstGeom prst="rect">
+              <a:avLst/>
+            </a:prstGeom>
+            <a:noFill/>
+            <a:ln w="28575">
+              <a:solidFill>
+                <a:schemeClr val="accent1"/>
+              </a:solidFill>
+            </a:ln>
+          </p:spPr>
+          <p:style>
+            <a:lnRef idx="2">
+              <a:schemeClr val="accent1">
+                <a:shade val="50000"/>
+              </a:schemeClr>
+            </a:lnRef>
+            <a:fillRef idx="1">
+              <a:schemeClr val="accent1"/>
+            </a:fillRef>
+            <a:effectRef idx="0">
+              <a:schemeClr val="accent1"/>
+            </a:effectRef>
+            <a:fontRef idx="minor">
+              <a:schemeClr val="lt1"/>
+            </a:fontRef>
+          </p:style>
+          <p:txBody>
+            <a:bodyPr rtlCol="0" anchor="ctr"/>
+            <a:lstStyle/>
+            <a:p>
+              <a:pPr algn="ctr"/>
+              <a:endParaRPr lang="en-CA" dirty="0"/>
+            </a:p>
+          </p:txBody>
+        </p:sp>
+        <p:sp>
+          <p:nvSpPr>
+            <p:cNvPr id="12" name="Rectangle 11">
+              <a:extLst>
+                <a:ext uri="{FF2B5EF4-FFF2-40B4-BE49-F238E27FC236}">
+                  <a16:creationId xmlns:a16="http://schemas.microsoft.com/office/drawing/2014/main" id="{ABAD5E39-410B-49BD-AAF8-8FBBE5DF71CD}"/>
+                </a:ext>
+              </a:extLst>
+            </p:cNvPr>
+            <p:cNvSpPr/>
+            <p:nvPr/>
+          </p:nvSpPr>
+          <p:spPr>
+            <a:xfrm>
+              <a:off x="2400636" y="1104691"/>
+              <a:ext cx="327533" cy="1858428"/>
+            </a:xfrm>
+            <a:prstGeom prst="rect">
+              <a:avLst/>
+            </a:prstGeom>
+            <a:noFill/>
+            <a:ln w="28575">
+              <a:solidFill>
+                <a:schemeClr val="accent1"/>
+              </a:solidFill>
+            </a:ln>
+          </p:spPr>
+          <p:style>
+            <a:lnRef idx="2">
+              <a:schemeClr val="accent1">
+                <a:shade val="50000"/>
+              </a:schemeClr>
+            </a:lnRef>
+            <a:fillRef idx="1">
+              <a:schemeClr val="accent1"/>
+            </a:fillRef>
+            <a:effectRef idx="0">
+              <a:schemeClr val="accent1"/>
+            </a:effectRef>
+            <a:fontRef idx="minor">
+              <a:schemeClr val="lt1"/>
+            </a:fontRef>
+          </p:style>
+          <p:txBody>
+            <a:bodyPr rtlCol="0" anchor="ctr"/>
+            <a:lstStyle/>
+            <a:p>
+              <a:pPr algn="ctr"/>
+              <a:endParaRPr lang="en-CA"/>
+            </a:p>
+          </p:txBody>
+        </p:sp>
+      </p:grpSp>
+      <p:sp>
+        <p:nvSpPr>
+          <p:cNvPr id="20" name="Title 7">
+            <a:extLst>
+              <a:ext uri="{FF2B5EF4-FFF2-40B4-BE49-F238E27FC236}">
+                <a16:creationId xmlns:a16="http://schemas.microsoft.com/office/drawing/2014/main" id="{AA162CED-38D1-4CF9-8086-70035B9501FB}"/>
+              </a:ext>
+            </a:extLst>
+          </p:cNvPr>
+          <p:cNvSpPr txBox="1">
+            <a:spLocks/>
+          </p:cNvSpPr>
+          <p:nvPr/>
+        </p:nvSpPr>
+        <p:spPr>
+          <a:xfrm>
+            <a:off x="628650" y="-371476"/>
+            <a:ext cx="7886700" cy="1325563"/>
+          </a:xfrm>
+          <a:prstGeom prst="rect">
+            <a:avLst/>
+          </a:prstGeom>
+        </p:spPr>
+        <p:txBody>
+          <a:bodyPr vert="horz" lIns="91440" tIns="45720" rIns="91440" bIns="45720" rtlCol="0" anchor="ctr">
+            <a:normAutofit/>
+          </a:bodyPr>
+          <a:lstStyle>
+            <a:lvl1pPr algn="l" defTabSz="914400" rtl="0" eaLnBrk="1" latinLnBrk="0" hangingPunct="1">
+              <a:lnSpc>
+                <a:spcPct val="90000"/>
+              </a:lnSpc>
+              <a:spcBef>
+                <a:spcPct val="0"/>
+              </a:spcBef>
+              <a:buNone/>
+              <a:defRPr sz="4400" kern="1200">
+                <a:solidFill>
+                  <a:schemeClr val="tx1"/>
+                </a:solidFill>
+                <a:latin typeface="+mj-lt"/>
+                <a:ea typeface="+mj-ea"/>
+                <a:cs typeface="+mj-cs"/>
+              </a:defRPr>
+            </a:lvl1pPr>
+          </a:lstStyle>
+          <a:p>
+            <a:pPr algn="ctr"/>
+            <a:r>
+              <a:rPr lang="en-CA" sz="3000" dirty="0"/>
+              <a:t>Data Cleaning</a:t>
+            </a:r>
+          </a:p>
+        </p:txBody>
+      </p:sp>
+      <p:cxnSp>
+        <p:nvCxnSpPr>
+          <p:cNvPr id="21" name="Straight Connector 20">
+            <a:extLst>
+              <a:ext uri="{FF2B5EF4-FFF2-40B4-BE49-F238E27FC236}">
+                <a16:creationId xmlns:a16="http://schemas.microsoft.com/office/drawing/2014/main" id="{265EEE6F-7AC0-4278-9C95-EA3EB290E133}"/>
+              </a:ext>
+            </a:extLst>
+          </p:cNvPr>
+          <p:cNvCxnSpPr/>
+          <p:nvPr/>
+        </p:nvCxnSpPr>
+        <p:spPr>
+          <a:xfrm>
+            <a:off x="0" y="528629"/>
+            <a:ext cx="9144000" cy="0"/>
+          </a:xfrm>
+          <a:prstGeom prst="line">
+            <a:avLst/>
+          </a:prstGeom>
+          <a:ln w="19050">
+            <a:solidFill>
+              <a:schemeClr val="tx1"/>
+            </a:solidFill>
+          </a:ln>
+        </p:spPr>
+        <p:style>
+          <a:lnRef idx="1">
+            <a:schemeClr val="accent1"/>
+          </a:lnRef>
+          <a:fillRef idx="0">
+            <a:schemeClr val="accent1"/>
+          </a:fillRef>
+          <a:effectRef idx="0">
+            <a:schemeClr val="accent1"/>
+          </a:effectRef>
+          <a:fontRef idx="minor">
+            <a:schemeClr val="tx1"/>
+          </a:fontRef>
+        </p:style>
+      </p:cxnSp>
+      <p:pic>
+        <p:nvPicPr>
+          <p:cNvPr id="9" name="Picture 8">
+            <a:extLst>
+              <a:ext uri="{FF2B5EF4-FFF2-40B4-BE49-F238E27FC236}">
+                <a16:creationId xmlns:a16="http://schemas.microsoft.com/office/drawing/2014/main" id="{A0EF3017-56F0-4B1B-85D4-1FA293E0B5E0}"/>
+              </a:ext>
+            </a:extLst>
+          </p:cNvPr>
+          <p:cNvPicPr>
+            <a:picLocks noChangeAspect="1"/>
+          </p:cNvPicPr>
+          <p:nvPr/>
+        </p:nvPicPr>
+        <p:blipFill>
+          <a:blip r:embed="rId4"/>
+          <a:stretch>
+            <a:fillRect/>
+          </a:stretch>
+        </p:blipFill>
+        <p:spPr>
+          <a:xfrm>
+            <a:off x="4499110" y="3585236"/>
+            <a:ext cx="4038600" cy="2771775"/>
+          </a:xfrm>
+          <a:prstGeom prst="rect">
+            <a:avLst/>
+          </a:prstGeom>
+          <a:ln w="38100">
+            <a:solidFill>
+              <a:schemeClr val="accent1"/>
+            </a:solidFill>
+          </a:ln>
+        </p:spPr>
+      </p:pic>
+    </p:spTree>
+    <p:extLst>
+      <p:ext uri="{BB962C8B-B14F-4D97-AF65-F5344CB8AC3E}">
+        <p14:creationId xmlns:p14="http://schemas.microsoft.com/office/powerpoint/2010/main" val="423623982"/>
+      </p:ext>
+    </p:extLst>
+  </p:cSld>
+  <p:clrMapOvr>
+    <a:masterClrMapping/>
+  </p:clrMapOvr>
+  <p:timing>
+    <p:tnLst>
+      <p:par>
+        <p:cTn id="1" dur="indefinite" restart="never" nodeType="tmRoot">
+          <p:childTnLst>
+            <p:seq concurrent="1" nextAc="seek">
+              <p:cTn id="2" dur="indefinite" nodeType="mainSeq">
+                <p:childTnLst>
+                  <p:par>
+                    <p:cTn id="3" fill="hold">
+                      <p:stCondLst>
+                        <p:cond delay="indefinite"/>
+                      </p:stCondLst>
+                      <p:childTnLst>
+                        <p:par>
+                          <p:cTn id="4" fill="hold">
+                            <p:stCondLst>
+                              <p:cond delay="0"/>
+                            </p:stCondLst>
+                            <p:childTnLst>
+                              <p:par>
+                                <p:cTn id="5" presetID="1" presetClass="entr" presetSubtype="0" fill="hold" nodeType="clickEffect">
+                                  <p:stCondLst>
+                                    <p:cond delay="0"/>
+                                  </p:stCondLst>
+                                  <p:childTnLst>
+                                    <p:set>
+                                      <p:cBhvr>
+                                        <p:cTn id="6" dur="1" fill="hold">
+                                          <p:stCondLst>
+                                            <p:cond delay="0"/>
+                                          </p:stCondLst>
+                                        </p:cTn>
+                                        <p:tgtEl>
+                                          <p:spTgt spid="17"/>
+                                        </p:tgtEl>
+                                        <p:attrNameLst>
+                                          <p:attrName>style.visibility</p:attrName>
+                                        </p:attrNameLst>
+                                      </p:cBhvr>
+                                      <p:to>
+                                        <p:strVal val="visible"/>
+                                      </p:to>
+                                    </p:set>
+                                  </p:childTnLst>
+                                </p:cTn>
+                              </p:par>
+                            </p:childTnLst>
+                          </p:cTn>
+                        </p:par>
+                      </p:childTnLst>
+                    </p:cTn>
+                  </p:par>
+                </p:childTnLst>
+              </p:cTn>
+              <p:prevCondLst>
+                <p:cond evt="onPrev" delay="0">
+                  <p:tgtEl>
+                    <p:sldTgt/>
+                  </p:tgtEl>
+                </p:cond>
+              </p:prevCondLst>
+              <p:nextCondLst>
+                <p:cond evt="onNext" delay="0">
+                  <p:tgtEl>
+                    <p:sldTgt/>
+                  </p:tgtEl>
+                </p:cond>
+              </p:nextCondLst>
+            </p:seq>
+          </p:childTnLst>
+        </p:cTn>
+      </p:par>
+    </p:tnLst>
+  </p:timing>
+</p:sld>
+</file>
+
+<file path=ppt/slides/slide7.xml><?xml version="1.0" encoding="utf-8"?>
+<p:sld xmlns:a="http://schemas.openxmlformats.org/drawingml/2006/main" xmlns:r="http://schemas.openxmlformats.org/officeDocument/2006/relationships" xmlns:p="http://schemas.openxmlformats.org/presentationml/2006/main">
+  <p:cSld>
+    <p:spTree>
+      <p:nvGrpSpPr>
+        <p:cNvPr id="1" name=""/>
+        <p:cNvGrpSpPr/>
+        <p:nvPr/>
+      </p:nvGrpSpPr>
+      <p:grpSpPr>
+        <a:xfrm>
+          <a:off x="0" y="0"/>
+          <a:ext cx="0" cy="0"/>
+          <a:chOff x="0" y="0"/>
+          <a:chExt cx="0" cy="0"/>
+        </a:xfrm>
+      </p:grpSpPr>
+      <p:sp>
+        <p:nvSpPr>
+          <p:cNvPr id="2" name="Title 1">
+            <a:extLst>
+              <a:ext uri="{FF2B5EF4-FFF2-40B4-BE49-F238E27FC236}">
+                <a16:creationId xmlns:a16="http://schemas.microsoft.com/office/drawing/2014/main" id="{C87D5EBE-5D8F-4C06-92CC-44DA5E4A8C06}"/>
+              </a:ext>
+            </a:extLst>
+          </p:cNvPr>
+          <p:cNvSpPr>
+            <a:spLocks noGrp="1"/>
+          </p:cNvSpPr>
+          <p:nvPr>
+            <p:ph type="title"/>
+          </p:nvPr>
+        </p:nvSpPr>
+        <p:spPr>
+          <a:xfrm>
+            <a:off x="628650" y="954087"/>
+            <a:ext cx="7886700" cy="1325563"/>
+          </a:xfrm>
+        </p:spPr>
+        <p:txBody>
+          <a:bodyPr/>
+          <a:lstStyle/>
+          <a:p>
+            <a:endParaRPr lang="en-CA" dirty="0"/>
+          </a:p>
+        </p:txBody>
+      </p:sp>
+      <p:grpSp>
+        <p:nvGrpSpPr>
+          <p:cNvPr id="3" name="Group 2">
+            <a:extLst>
+              <a:ext uri="{FF2B5EF4-FFF2-40B4-BE49-F238E27FC236}">
+                <a16:creationId xmlns:a16="http://schemas.microsoft.com/office/drawing/2014/main" id="{AE93098D-D6C5-4FFB-B05C-413E71F98249}"/>
+              </a:ext>
+            </a:extLst>
+          </p:cNvPr>
+          <p:cNvGrpSpPr/>
+          <p:nvPr/>
+        </p:nvGrpSpPr>
+        <p:grpSpPr>
+          <a:xfrm>
+            <a:off x="373599" y="954087"/>
+            <a:ext cx="8396801" cy="4985402"/>
+            <a:chOff x="0" y="1996357"/>
+            <a:chExt cx="9144000" cy="5429036"/>
+          </a:xfrm>
+        </p:grpSpPr>
+        <p:pic>
+          <p:nvPicPr>
+            <p:cNvPr id="4" name="Picture 3">
+              <a:extLst>
+                <a:ext uri="{FF2B5EF4-FFF2-40B4-BE49-F238E27FC236}">
+                  <a16:creationId xmlns:a16="http://schemas.microsoft.com/office/drawing/2014/main" id="{0B677AB0-1688-4490-A6CA-B3DE1358D215}"/>
+                </a:ext>
+              </a:extLst>
+            </p:cNvPr>
+            <p:cNvPicPr>
+              <a:picLocks noChangeAspect="1"/>
+            </p:cNvPicPr>
+            <p:nvPr/>
+          </p:nvPicPr>
+          <p:blipFill>
+            <a:blip r:embed="rId2"/>
+            <a:stretch>
+              <a:fillRect/>
+            </a:stretch>
+          </p:blipFill>
+          <p:spPr>
+            <a:xfrm>
+              <a:off x="108974" y="4954406"/>
+              <a:ext cx="7579922" cy="2470987"/>
+            </a:xfrm>
+            <a:prstGeom prst="rect">
+              <a:avLst/>
+            </a:prstGeom>
+          </p:spPr>
+        </p:pic>
+        <p:pic>
+          <p:nvPicPr>
+            <p:cNvPr id="5" name="Picture 4">
+              <a:extLst>
+                <a:ext uri="{FF2B5EF4-FFF2-40B4-BE49-F238E27FC236}">
+                  <a16:creationId xmlns:a16="http://schemas.microsoft.com/office/drawing/2014/main" id="{5282A2FE-6CCD-4553-ADCC-530527BBCAA3}"/>
+                </a:ext>
+              </a:extLst>
+            </p:cNvPr>
+            <p:cNvPicPr>
+              <a:picLocks noChangeAspect="1"/>
+            </p:cNvPicPr>
+            <p:nvPr/>
+          </p:nvPicPr>
+          <p:blipFill>
+            <a:blip r:embed="rId3"/>
+            <a:stretch>
+              <a:fillRect/>
+            </a:stretch>
+          </p:blipFill>
+          <p:spPr>
+            <a:xfrm>
+              <a:off x="0" y="1996357"/>
+              <a:ext cx="9144000" cy="2865286"/>
+            </a:xfrm>
+            <a:prstGeom prst="rect">
+              <a:avLst/>
+            </a:prstGeom>
+          </p:spPr>
+        </p:pic>
+      </p:grpSp>
+      <p:grpSp>
+        <p:nvGrpSpPr>
+          <p:cNvPr id="17" name="Group 16">
+            <a:extLst>
+              <a:ext uri="{FF2B5EF4-FFF2-40B4-BE49-F238E27FC236}">
+                <a16:creationId xmlns:a16="http://schemas.microsoft.com/office/drawing/2014/main" id="{56842345-D00F-4F6E-8933-CF77E71962D9}"/>
+              </a:ext>
+            </a:extLst>
+          </p:cNvPr>
+          <p:cNvGrpSpPr/>
+          <p:nvPr/>
+        </p:nvGrpSpPr>
+        <p:grpSpPr>
+          <a:xfrm>
+            <a:off x="1546034" y="1350436"/>
+            <a:ext cx="3766746" cy="4589051"/>
+            <a:chOff x="-552440" y="797051"/>
+            <a:chExt cx="3766746" cy="4589051"/>
+          </a:xfrm>
+        </p:grpSpPr>
+        <p:sp>
+          <p:nvSpPr>
+            <p:cNvPr id="6" name="Rectangle 5">
+              <a:extLst>
+                <a:ext uri="{FF2B5EF4-FFF2-40B4-BE49-F238E27FC236}">
+                  <a16:creationId xmlns:a16="http://schemas.microsoft.com/office/drawing/2014/main" id="{ED538DD6-B1E3-496C-ADF7-AB8B9A6898D2}"/>
+                </a:ext>
+              </a:extLst>
+            </p:cNvPr>
+            <p:cNvSpPr/>
+            <p:nvPr/>
+          </p:nvSpPr>
+          <p:spPr>
+            <a:xfrm>
+              <a:off x="2392503" y="797051"/>
+              <a:ext cx="821803" cy="2234800"/>
+            </a:xfrm>
+            <a:prstGeom prst="rect">
+              <a:avLst/>
+            </a:prstGeom>
+            <a:noFill/>
+            <a:ln w="28575">
+              <a:solidFill>
+                <a:schemeClr val="tx2"/>
+              </a:solidFill>
+            </a:ln>
+          </p:spPr>
+          <p:style>
+            <a:lnRef idx="2">
+              <a:schemeClr val="accent1">
+                <a:shade val="50000"/>
+              </a:schemeClr>
+            </a:lnRef>
+            <a:fillRef idx="1">
+              <a:schemeClr val="accent1"/>
+            </a:fillRef>
+            <a:effectRef idx="0">
+              <a:schemeClr val="accent1"/>
+            </a:effectRef>
+            <a:fontRef idx="minor">
+              <a:schemeClr val="lt1"/>
+            </a:fontRef>
+          </p:style>
+          <p:txBody>
+            <a:bodyPr rtlCol="0" anchor="ctr"/>
+            <a:lstStyle/>
+            <a:p>
+              <a:pPr algn="ctr"/>
+              <a:endParaRPr lang="en-CA" dirty="0"/>
+            </a:p>
+          </p:txBody>
+        </p:sp>
+        <p:sp>
+          <p:nvSpPr>
+            <p:cNvPr id="12" name="Rectangle 11">
+              <a:extLst>
+                <a:ext uri="{FF2B5EF4-FFF2-40B4-BE49-F238E27FC236}">
+                  <a16:creationId xmlns:a16="http://schemas.microsoft.com/office/drawing/2014/main" id="{ABAD5E39-410B-49BD-AAF8-8FBBE5DF71CD}"/>
+                </a:ext>
+              </a:extLst>
+            </p:cNvPr>
+            <p:cNvSpPr/>
+            <p:nvPr/>
+          </p:nvSpPr>
+          <p:spPr>
+            <a:xfrm>
+              <a:off x="-552440" y="3117033"/>
+              <a:ext cx="1289763" cy="2269069"/>
+            </a:xfrm>
+            <a:prstGeom prst="rect">
+              <a:avLst/>
+            </a:prstGeom>
+            <a:noFill/>
+            <a:ln w="28575">
+              <a:solidFill>
+                <a:schemeClr val="tx2"/>
+              </a:solidFill>
+            </a:ln>
+          </p:spPr>
+          <p:style>
+            <a:lnRef idx="2">
+              <a:schemeClr val="accent1">
+                <a:shade val="50000"/>
+              </a:schemeClr>
+            </a:lnRef>
+            <a:fillRef idx="1">
+              <a:schemeClr val="accent1"/>
+            </a:fillRef>
+            <a:effectRef idx="0">
+              <a:schemeClr val="accent1"/>
+            </a:effectRef>
+            <a:fontRef idx="minor">
+              <a:schemeClr val="lt1"/>
+            </a:fontRef>
+          </p:style>
+          <p:txBody>
+            <a:bodyPr rtlCol="0" anchor="ctr"/>
+            <a:lstStyle/>
+            <a:p>
+              <a:pPr algn="ctr"/>
+              <a:endParaRPr lang="en-CA"/>
+            </a:p>
+          </p:txBody>
+        </p:sp>
+      </p:grpSp>
+      <p:sp>
+        <p:nvSpPr>
+          <p:cNvPr id="20" name="Title 7">
+            <a:extLst>
+              <a:ext uri="{FF2B5EF4-FFF2-40B4-BE49-F238E27FC236}">
+                <a16:creationId xmlns:a16="http://schemas.microsoft.com/office/drawing/2014/main" id="{AA162CED-38D1-4CF9-8086-70035B9501FB}"/>
+              </a:ext>
+            </a:extLst>
+          </p:cNvPr>
+          <p:cNvSpPr txBox="1">
+            <a:spLocks/>
+          </p:cNvSpPr>
+          <p:nvPr/>
+        </p:nvSpPr>
+        <p:spPr>
+          <a:xfrm>
+            <a:off x="628650" y="-371476"/>
+            <a:ext cx="7886700" cy="1325563"/>
+          </a:xfrm>
+          <a:prstGeom prst="rect">
+            <a:avLst/>
+          </a:prstGeom>
+        </p:spPr>
+        <p:txBody>
+          <a:bodyPr vert="horz" lIns="91440" tIns="45720" rIns="91440" bIns="45720" rtlCol="0" anchor="ctr">
+            <a:normAutofit/>
+          </a:bodyPr>
+          <a:lstStyle>
+            <a:lvl1pPr algn="l" defTabSz="914400" rtl="0" eaLnBrk="1" latinLnBrk="0" hangingPunct="1">
+              <a:lnSpc>
+                <a:spcPct val="90000"/>
+              </a:lnSpc>
+              <a:spcBef>
+                <a:spcPct val="0"/>
+              </a:spcBef>
+              <a:buNone/>
+              <a:defRPr sz="4400" kern="1200">
+                <a:solidFill>
+                  <a:schemeClr val="tx1"/>
+                </a:solidFill>
+                <a:latin typeface="+mj-lt"/>
+                <a:ea typeface="+mj-ea"/>
+                <a:cs typeface="+mj-cs"/>
+              </a:defRPr>
+            </a:lvl1pPr>
+          </a:lstStyle>
+          <a:p>
+            <a:pPr algn="ctr"/>
+            <a:r>
+              <a:rPr lang="en-CA" sz="3000" dirty="0"/>
+              <a:t>Data Cleaning</a:t>
+            </a:r>
+          </a:p>
+        </p:txBody>
+      </p:sp>
+      <p:cxnSp>
+        <p:nvCxnSpPr>
+          <p:cNvPr id="21" name="Straight Connector 20">
+            <a:extLst>
+              <a:ext uri="{FF2B5EF4-FFF2-40B4-BE49-F238E27FC236}">
+                <a16:creationId xmlns:a16="http://schemas.microsoft.com/office/drawing/2014/main" id="{265EEE6F-7AC0-4278-9C95-EA3EB290E133}"/>
+              </a:ext>
+            </a:extLst>
+          </p:cNvPr>
+          <p:cNvCxnSpPr/>
+          <p:nvPr/>
+        </p:nvCxnSpPr>
+        <p:spPr>
+          <a:xfrm>
+            <a:off x="0" y="528629"/>
+            <a:ext cx="9144000" cy="0"/>
+          </a:xfrm>
+          <a:prstGeom prst="line">
+            <a:avLst/>
+          </a:prstGeom>
+          <a:ln w="19050">
+            <a:solidFill>
+              <a:schemeClr val="tx1"/>
+            </a:solidFill>
+          </a:ln>
+        </p:spPr>
+        <p:style>
+          <a:lnRef idx="1">
+            <a:schemeClr val="accent1"/>
+          </a:lnRef>
+          <a:fillRef idx="0">
+            <a:schemeClr val="accent1"/>
+          </a:fillRef>
+          <a:effectRef idx="0">
+            <a:schemeClr val="accent1"/>
+          </a:effectRef>
+          <a:fontRef idx="minor">
+            <a:schemeClr val="tx1"/>
+          </a:fontRef>
+        </p:style>
+      </p:cxnSp>
+      <p:sp>
+        <p:nvSpPr>
+          <p:cNvPr id="13" name="TextBox 12">
+            <a:extLst>
+              <a:ext uri="{FF2B5EF4-FFF2-40B4-BE49-F238E27FC236}">
+                <a16:creationId xmlns:a16="http://schemas.microsoft.com/office/drawing/2014/main" id="{88CFE7B7-6D5D-4EDB-8910-EC46CED12A63}"/>
+              </a:ext>
+            </a:extLst>
+          </p:cNvPr>
+          <p:cNvSpPr txBox="1"/>
+          <p:nvPr/>
+        </p:nvSpPr>
+        <p:spPr>
+          <a:xfrm>
+            <a:off x="1161990" y="6160094"/>
+            <a:ext cx="3328987" cy="338554"/>
+          </a:xfrm>
+          <a:prstGeom prst="rect">
+            <a:avLst/>
+          </a:prstGeom>
+          <a:noFill/>
+        </p:spPr>
+        <p:txBody>
+          <a:bodyPr wrap="square" rtlCol="0">
+            <a:spAutoFit/>
+          </a:bodyPr>
+          <a:lstStyle/>
+          <a:p>
+            <a:pPr marL="285750" indent="-285750">
+              <a:buFont typeface="Arial" panose="020B0604020202020204" pitchFamily="34" charset="0"/>
+              <a:buChar char="•"/>
+            </a:pPr>
+            <a:r>
+              <a:rPr lang="en-CA" sz="1600" dirty="0"/>
+              <a:t>Changed to ‘datetime’ objects</a:t>
+            </a:r>
+          </a:p>
+        </p:txBody>
+      </p:sp>
+    </p:spTree>
+    <p:extLst>
+      <p:ext uri="{BB962C8B-B14F-4D97-AF65-F5344CB8AC3E}">
+        <p14:creationId xmlns:p14="http://schemas.microsoft.com/office/powerpoint/2010/main" val="3324222619"/>
+      </p:ext>
+    </p:extLst>
+  </p:cSld>
+  <p:clrMapOvr>
+    <a:masterClrMapping/>
+  </p:clrMapOvr>
+  <p:timing>
+    <p:tnLst>
+      <p:par>
+        <p:cTn id="1" dur="indefinite" restart="never" nodeType="tmRoot">
+          <p:childTnLst>
+            <p:seq concurrent="1" nextAc="seek">
+              <p:cTn id="2" dur="indefinite" nodeType="mainSeq">
+                <p:childTnLst>
+                  <p:par>
+                    <p:cTn id="3" fill="hold">
+                      <p:stCondLst>
+                        <p:cond delay="indefinite"/>
+                      </p:stCondLst>
+                      <p:childTnLst>
+                        <p:par>
+                          <p:cTn id="4" fill="hold">
+                            <p:stCondLst>
+                              <p:cond delay="0"/>
+                            </p:stCondLst>
+                            <p:childTnLst>
+                              <p:par>
+                                <p:cTn id="5" presetID="1" presetClass="entr" presetSubtype="0" fill="hold" nodeType="clickEffect">
+                                  <p:stCondLst>
+                                    <p:cond delay="0"/>
+                                  </p:stCondLst>
+                                  <p:childTnLst>
+                                    <p:set>
+                                      <p:cBhvr>
+                                        <p:cTn id="6" dur="1" fill="hold">
+                                          <p:stCondLst>
+                                            <p:cond delay="0"/>
+                                          </p:stCondLst>
+                                        </p:cTn>
+                                        <p:tgtEl>
+                                          <p:spTgt spid="17"/>
+                                        </p:tgtEl>
+                                        <p:attrNameLst>
+                                          <p:attrName>style.visibility</p:attrName>
+                                        </p:attrNameLst>
+                                      </p:cBhvr>
+                                      <p:to>
+                                        <p:strVal val="visible"/>
+                                      </p:to>
+                                    </p:set>
+                                  </p:childTnLst>
+                                </p:cTn>
+                              </p:par>
+                            </p:childTnLst>
+                          </p:cTn>
+                        </p:par>
+                      </p:childTnLst>
+                    </p:cTn>
+                  </p:par>
+                </p:childTnLst>
+              </p:cTn>
+              <p:prevCondLst>
+                <p:cond evt="onPrev" delay="0">
+                  <p:tgtEl>
+                    <p:sldTgt/>
+                  </p:tgtEl>
+                </p:cond>
+              </p:prevCondLst>
+              <p:nextCondLst>
+                <p:cond evt="onNext" delay="0">
+                  <p:tgtEl>
+                    <p:sldTgt/>
+                  </p:tgtEl>
+                </p:cond>
+              </p:nextCondLst>
+            </p:seq>
+          </p:childTnLst>
+        </p:cTn>
+      </p:par>
+    </p:tnLst>
+  </p:timing>
+</p:sld>
+</file>
+
+<file path=ppt/slides/slide8.xml><?xml version="1.0" encoding="utf-8"?>
+<p:sld xmlns:a="http://schemas.openxmlformats.org/drawingml/2006/main" xmlns:r="http://schemas.openxmlformats.org/officeDocument/2006/relationships" xmlns:p="http://schemas.openxmlformats.org/presentationml/2006/main">
+  <p:cSld>
+    <p:spTree>
+      <p:nvGrpSpPr>
+        <p:cNvPr id="1" name=""/>
+        <p:cNvGrpSpPr/>
+        <p:nvPr/>
+      </p:nvGrpSpPr>
+      <p:grpSpPr>
+        <a:xfrm>
+          <a:off x="0" y="0"/>
+          <a:ext cx="0" cy="0"/>
+          <a:chOff x="0" y="0"/>
+          <a:chExt cx="0" cy="0"/>
+        </a:xfrm>
+      </p:grpSpPr>
+      <p:sp>
+        <p:nvSpPr>
+          <p:cNvPr id="2" name="Title 1">
+            <a:extLst>
+              <a:ext uri="{FF2B5EF4-FFF2-40B4-BE49-F238E27FC236}">
+                <a16:creationId xmlns:a16="http://schemas.microsoft.com/office/drawing/2014/main" id="{C87D5EBE-5D8F-4C06-92CC-44DA5E4A8C06}"/>
+              </a:ext>
+            </a:extLst>
+          </p:cNvPr>
+          <p:cNvSpPr>
+            <a:spLocks noGrp="1"/>
+          </p:cNvSpPr>
+          <p:nvPr>
+            <p:ph type="title"/>
+          </p:nvPr>
+        </p:nvSpPr>
+        <p:spPr>
+          <a:xfrm>
+            <a:off x="628650" y="954087"/>
+            <a:ext cx="7886700" cy="1325563"/>
+          </a:xfrm>
+        </p:spPr>
+        <p:txBody>
+          <a:bodyPr/>
+          <a:lstStyle/>
+          <a:p>
+            <a:endParaRPr lang="en-CA" dirty="0"/>
+          </a:p>
+        </p:txBody>
+      </p:sp>
+      <p:grpSp>
+        <p:nvGrpSpPr>
+          <p:cNvPr id="3" name="Group 2">
+            <a:extLst>
+              <a:ext uri="{FF2B5EF4-FFF2-40B4-BE49-F238E27FC236}">
+                <a16:creationId xmlns:a16="http://schemas.microsoft.com/office/drawing/2014/main" id="{AE93098D-D6C5-4FFB-B05C-413E71F98249}"/>
+              </a:ext>
+            </a:extLst>
+          </p:cNvPr>
+          <p:cNvGrpSpPr/>
+          <p:nvPr/>
+        </p:nvGrpSpPr>
+        <p:grpSpPr>
+          <a:xfrm>
+            <a:off x="373599" y="954087"/>
+            <a:ext cx="8396801" cy="4985402"/>
+            <a:chOff x="0" y="1996357"/>
+            <a:chExt cx="9144000" cy="5429036"/>
+          </a:xfrm>
+        </p:grpSpPr>
+        <p:pic>
+          <p:nvPicPr>
+            <p:cNvPr id="4" name="Picture 3">
+              <a:extLst>
+                <a:ext uri="{FF2B5EF4-FFF2-40B4-BE49-F238E27FC236}">
+                  <a16:creationId xmlns:a16="http://schemas.microsoft.com/office/drawing/2014/main" id="{0B677AB0-1688-4490-A6CA-B3DE1358D215}"/>
+                </a:ext>
+              </a:extLst>
+            </p:cNvPr>
+            <p:cNvPicPr>
+              <a:picLocks noChangeAspect="1"/>
+            </p:cNvPicPr>
+            <p:nvPr/>
+          </p:nvPicPr>
+          <p:blipFill>
+            <a:blip r:embed="rId2"/>
+            <a:stretch>
+              <a:fillRect/>
+            </a:stretch>
+          </p:blipFill>
+          <p:spPr>
+            <a:xfrm>
+              <a:off x="108974" y="4954406"/>
+              <a:ext cx="7579922" cy="2470987"/>
+            </a:xfrm>
+            <a:prstGeom prst="rect">
+              <a:avLst/>
+            </a:prstGeom>
+          </p:spPr>
+        </p:pic>
+        <p:pic>
+          <p:nvPicPr>
+            <p:cNvPr id="5" name="Picture 4">
+              <a:extLst>
+                <a:ext uri="{FF2B5EF4-FFF2-40B4-BE49-F238E27FC236}">
+                  <a16:creationId xmlns:a16="http://schemas.microsoft.com/office/drawing/2014/main" id="{5282A2FE-6CCD-4553-ADCC-530527BBCAA3}"/>
+                </a:ext>
+              </a:extLst>
+            </p:cNvPr>
+            <p:cNvPicPr>
+              <a:picLocks noChangeAspect="1"/>
+            </p:cNvPicPr>
+            <p:nvPr/>
+          </p:nvPicPr>
+          <p:blipFill>
+            <a:blip r:embed="rId3"/>
+            <a:stretch>
+              <a:fillRect/>
+            </a:stretch>
+          </p:blipFill>
+          <p:spPr>
+            <a:xfrm>
+              <a:off x="0" y="1996357"/>
+              <a:ext cx="9144000" cy="2865286"/>
+            </a:xfrm>
+            <a:prstGeom prst="rect">
+              <a:avLst/>
+            </a:prstGeom>
+          </p:spPr>
+        </p:pic>
+      </p:grpSp>
+      <p:sp>
+        <p:nvSpPr>
+          <p:cNvPr id="20" name="Title 7">
+            <a:extLst>
+              <a:ext uri="{FF2B5EF4-FFF2-40B4-BE49-F238E27FC236}">
+                <a16:creationId xmlns:a16="http://schemas.microsoft.com/office/drawing/2014/main" id="{AA162CED-38D1-4CF9-8086-70035B9501FB}"/>
+              </a:ext>
+            </a:extLst>
+          </p:cNvPr>
+          <p:cNvSpPr txBox="1">
+            <a:spLocks/>
+          </p:cNvSpPr>
+          <p:nvPr/>
+        </p:nvSpPr>
+        <p:spPr>
+          <a:xfrm>
+            <a:off x="628650" y="-371476"/>
+            <a:ext cx="7886700" cy="1325563"/>
+          </a:xfrm>
+          <a:prstGeom prst="rect">
+            <a:avLst/>
+          </a:prstGeom>
+        </p:spPr>
+        <p:txBody>
+          <a:bodyPr vert="horz" lIns="91440" tIns="45720" rIns="91440" bIns="45720" rtlCol="0" anchor="ctr">
+            <a:normAutofit/>
+          </a:bodyPr>
+          <a:lstStyle>
+            <a:lvl1pPr algn="l" defTabSz="914400" rtl="0" eaLnBrk="1" latinLnBrk="0" hangingPunct="1">
+              <a:lnSpc>
+                <a:spcPct val="90000"/>
+              </a:lnSpc>
+              <a:spcBef>
+                <a:spcPct val="0"/>
+              </a:spcBef>
+              <a:buNone/>
+              <a:defRPr sz="4400" kern="1200">
+                <a:solidFill>
+                  <a:schemeClr val="tx1"/>
+                </a:solidFill>
+                <a:latin typeface="+mj-lt"/>
+                <a:ea typeface="+mj-ea"/>
+                <a:cs typeface="+mj-cs"/>
+              </a:defRPr>
+            </a:lvl1pPr>
+          </a:lstStyle>
+          <a:p>
+            <a:pPr algn="ctr"/>
+            <a:r>
+              <a:rPr lang="en-CA" sz="3000" dirty="0"/>
+              <a:t>Data Cleaning</a:t>
+            </a:r>
+          </a:p>
+        </p:txBody>
+      </p:sp>
+      <p:cxnSp>
+        <p:nvCxnSpPr>
+          <p:cNvPr id="21" name="Straight Connector 20">
+            <a:extLst>
+              <a:ext uri="{FF2B5EF4-FFF2-40B4-BE49-F238E27FC236}">
+                <a16:creationId xmlns:a16="http://schemas.microsoft.com/office/drawing/2014/main" id="{265EEE6F-7AC0-4278-9C95-EA3EB290E133}"/>
+              </a:ext>
+            </a:extLst>
+          </p:cNvPr>
+          <p:cNvCxnSpPr/>
+          <p:nvPr/>
+        </p:nvCxnSpPr>
+        <p:spPr>
+          <a:xfrm>
+            <a:off x="0" y="528629"/>
+            <a:ext cx="9144000" cy="0"/>
+          </a:xfrm>
+          <a:prstGeom prst="line">
+            <a:avLst/>
+          </a:prstGeom>
+          <a:ln w="19050">
+            <a:solidFill>
+              <a:schemeClr val="tx1"/>
+            </a:solidFill>
+          </a:ln>
+        </p:spPr>
+        <p:style>
+          <a:lnRef idx="1">
+            <a:schemeClr val="accent1"/>
+          </a:lnRef>
+          <a:fillRef idx="0">
+            <a:schemeClr val="accent1"/>
+          </a:fillRef>
+          <a:effectRef idx="0">
+            <a:schemeClr val="accent1"/>
+          </a:effectRef>
+          <a:fontRef idx="minor">
+            <a:schemeClr val="tx1"/>
+          </a:fontRef>
+        </p:style>
+      </p:cxnSp>
+      <p:sp>
+        <p:nvSpPr>
+          <p:cNvPr id="13" name="TextBox 12">
+            <a:extLst>
+              <a:ext uri="{FF2B5EF4-FFF2-40B4-BE49-F238E27FC236}">
+                <a16:creationId xmlns:a16="http://schemas.microsoft.com/office/drawing/2014/main" id="{88CFE7B7-6D5D-4EDB-8910-EC46CED12A63}"/>
+              </a:ext>
+            </a:extLst>
+          </p:cNvPr>
+          <p:cNvSpPr txBox="1"/>
+          <p:nvPr/>
+        </p:nvSpPr>
+        <p:spPr>
+          <a:xfrm>
+            <a:off x="511442" y="5985167"/>
+            <a:ext cx="7397490" cy="830997"/>
+          </a:xfrm>
+          <a:prstGeom prst="rect">
+            <a:avLst/>
+          </a:prstGeom>
+          <a:noFill/>
+        </p:spPr>
+        <p:txBody>
+          <a:bodyPr wrap="square" rtlCol="0">
+            <a:spAutoFit/>
+          </a:bodyPr>
+          <a:lstStyle/>
+          <a:p>
+            <a:pPr marL="285750" indent="-285750">
+              <a:buFont typeface="Arial" panose="020B0604020202020204" pitchFamily="34" charset="0"/>
+              <a:buChar char="•"/>
+            </a:pPr>
+            <a:r>
+              <a:rPr lang="en-CA" sz="1600" dirty="0"/>
+              <a:t>Added 2 new columns</a:t>
+            </a:r>
+          </a:p>
+          <a:p>
+            <a:pPr marL="800100" lvl="1" indent="-342900">
+              <a:buFont typeface="+mj-lt"/>
+              <a:buAutoNum type="arabicPeriod"/>
+            </a:pPr>
+            <a:r>
+              <a:rPr lang="en-CA" sz="1600" dirty="0"/>
+              <a:t>“</a:t>
+            </a:r>
+            <a:r>
+              <a:rPr lang="en-CA" sz="1600" dirty="0" err="1"/>
+              <a:t>Days_on_market</a:t>
+            </a:r>
+            <a:r>
+              <a:rPr lang="en-CA" sz="1600" dirty="0"/>
+              <a:t>” = Today - “</a:t>
+            </a:r>
+            <a:r>
+              <a:rPr lang="en-CA" sz="1600" dirty="0" err="1"/>
+              <a:t>Listed_on</a:t>
+            </a:r>
+            <a:r>
+              <a:rPr lang="en-CA" sz="1600" dirty="0"/>
+              <a:t>”</a:t>
+            </a:r>
+          </a:p>
+          <a:p>
+            <a:pPr marL="800100" lvl="1" indent="-342900">
+              <a:buFont typeface="+mj-lt"/>
+              <a:buAutoNum type="arabicPeriod"/>
+            </a:pPr>
+            <a:r>
+              <a:rPr lang="en-CA" sz="1600" dirty="0"/>
+              <a:t>“</a:t>
+            </a:r>
+            <a:r>
+              <a:rPr lang="en-CA" sz="1600" dirty="0" err="1"/>
+              <a:t>Estimated_capital_gain</a:t>
+            </a:r>
+            <a:r>
+              <a:rPr lang="en-CA" sz="1600" dirty="0"/>
+              <a:t>” = “</a:t>
+            </a:r>
+            <a:r>
+              <a:rPr lang="en-CA" sz="1600" dirty="0" err="1"/>
+              <a:t>Estimated_price</a:t>
+            </a:r>
+            <a:r>
+              <a:rPr lang="en-CA" sz="1600" dirty="0"/>
+              <a:t>” – “Price” </a:t>
+            </a:r>
+          </a:p>
+        </p:txBody>
+      </p:sp>
+      <p:pic>
+        <p:nvPicPr>
+          <p:cNvPr id="7" name="Picture 6">
+            <a:extLst>
+              <a:ext uri="{FF2B5EF4-FFF2-40B4-BE49-F238E27FC236}">
+                <a16:creationId xmlns:a16="http://schemas.microsoft.com/office/drawing/2014/main" id="{F3791389-9452-4835-8F6E-9156F308586A}"/>
+              </a:ext>
+            </a:extLst>
+          </p:cNvPr>
+          <p:cNvPicPr>
+            <a:picLocks noChangeAspect="1"/>
+          </p:cNvPicPr>
+          <p:nvPr/>
+        </p:nvPicPr>
+        <p:blipFill>
+          <a:blip r:embed="rId4"/>
+          <a:stretch>
+            <a:fillRect/>
+          </a:stretch>
+        </p:blipFill>
+        <p:spPr>
+          <a:xfrm>
+            <a:off x="176830" y="7194690"/>
+            <a:ext cx="6429375" cy="3209925"/>
+          </a:xfrm>
+          <a:prstGeom prst="rect">
+            <a:avLst/>
+          </a:prstGeom>
+        </p:spPr>
+      </p:pic>
+      <p:pic>
+        <p:nvPicPr>
+          <p:cNvPr id="9" name="Picture 8">
+            <a:extLst>
+              <a:ext uri="{FF2B5EF4-FFF2-40B4-BE49-F238E27FC236}">
+                <a16:creationId xmlns:a16="http://schemas.microsoft.com/office/drawing/2014/main" id="{0C7EFE1B-FA43-4B40-AAD1-56DE2BE9B0BC}"/>
+              </a:ext>
+            </a:extLst>
+          </p:cNvPr>
+          <p:cNvPicPr>
+            <a:picLocks noChangeAspect="1"/>
+          </p:cNvPicPr>
+          <p:nvPr/>
+        </p:nvPicPr>
+        <p:blipFill>
+          <a:blip r:embed="rId5"/>
+          <a:stretch>
+            <a:fillRect/>
+          </a:stretch>
+        </p:blipFill>
+        <p:spPr>
+          <a:xfrm>
+            <a:off x="6821977" y="3716099"/>
+            <a:ext cx="2113680" cy="2228972"/>
+          </a:xfrm>
+          <a:prstGeom prst="rect">
+            <a:avLst/>
+          </a:prstGeom>
+          <a:ln w="38100">
+            <a:solidFill>
+              <a:schemeClr val="accent6">
+                <a:lumMod val="60000"/>
+                <a:lumOff val="40000"/>
+              </a:schemeClr>
+            </a:solidFill>
+          </a:ln>
+        </p:spPr>
+      </p:pic>
+      <p:grpSp>
+        <p:nvGrpSpPr>
+          <p:cNvPr id="15" name="Group 14">
+            <a:extLst>
+              <a:ext uri="{FF2B5EF4-FFF2-40B4-BE49-F238E27FC236}">
+                <a16:creationId xmlns:a16="http://schemas.microsoft.com/office/drawing/2014/main" id="{F4C3F83E-456B-4546-BD64-BCB6A70C97A1}"/>
+              </a:ext>
+            </a:extLst>
+          </p:cNvPr>
+          <p:cNvGrpSpPr/>
+          <p:nvPr/>
+        </p:nvGrpSpPr>
+        <p:grpSpPr>
+          <a:xfrm>
+            <a:off x="1546034" y="1325810"/>
+            <a:ext cx="2979668" cy="4613677"/>
+            <a:chOff x="-552440" y="772425"/>
+            <a:chExt cx="2979668" cy="4613677"/>
+          </a:xfrm>
+        </p:grpSpPr>
+        <p:sp>
+          <p:nvSpPr>
+            <p:cNvPr id="16" name="Rectangle 15">
+              <a:extLst>
+                <a:ext uri="{FF2B5EF4-FFF2-40B4-BE49-F238E27FC236}">
+                  <a16:creationId xmlns:a16="http://schemas.microsoft.com/office/drawing/2014/main" id="{A941681A-AC56-416B-BAF3-D973587A4685}"/>
+                </a:ext>
+              </a:extLst>
+            </p:cNvPr>
+            <p:cNvSpPr/>
+            <p:nvPr/>
+          </p:nvSpPr>
+          <p:spPr>
+            <a:xfrm>
+              <a:off x="1068381" y="772425"/>
+              <a:ext cx="1358847" cy="2234800"/>
+            </a:xfrm>
+            <a:prstGeom prst="rect">
+              <a:avLst/>
+            </a:prstGeom>
+            <a:noFill/>
+            <a:ln w="28575">
+              <a:solidFill>
+                <a:schemeClr val="accent6">
+                  <a:lumMod val="60000"/>
+                  <a:lumOff val="40000"/>
+                </a:schemeClr>
+              </a:solidFill>
+            </a:ln>
+          </p:spPr>
+          <p:style>
+            <a:lnRef idx="2">
+              <a:schemeClr val="accent1">
+                <a:shade val="50000"/>
+              </a:schemeClr>
+            </a:lnRef>
+            <a:fillRef idx="1">
+              <a:schemeClr val="accent1"/>
+            </a:fillRef>
+            <a:effectRef idx="0">
+              <a:schemeClr val="accent1"/>
+            </a:effectRef>
+            <a:fontRef idx="minor">
+              <a:schemeClr val="lt1"/>
+            </a:fontRef>
+          </p:style>
+          <p:txBody>
+            <a:bodyPr rtlCol="0" anchor="ctr"/>
+            <a:lstStyle/>
+            <a:p>
+              <a:pPr algn="ctr"/>
+              <a:endParaRPr lang="en-CA" dirty="0"/>
+            </a:p>
+          </p:txBody>
+        </p:sp>
+        <p:sp>
+          <p:nvSpPr>
+            <p:cNvPr id="18" name="Rectangle 17">
+              <a:extLst>
+                <a:ext uri="{FF2B5EF4-FFF2-40B4-BE49-F238E27FC236}">
+                  <a16:creationId xmlns:a16="http://schemas.microsoft.com/office/drawing/2014/main" id="{6F2E42F9-E16C-4507-ABF2-A3AE0935D1D4}"/>
+                </a:ext>
+              </a:extLst>
+            </p:cNvPr>
+            <p:cNvSpPr/>
+            <p:nvPr/>
+          </p:nvSpPr>
+          <p:spPr>
+            <a:xfrm>
+              <a:off x="-552440" y="3117033"/>
+              <a:ext cx="606857" cy="2269069"/>
+            </a:xfrm>
+            <a:prstGeom prst="rect">
+              <a:avLst/>
+            </a:prstGeom>
+            <a:noFill/>
+            <a:ln w="28575">
+              <a:solidFill>
+                <a:schemeClr val="accent6">
+                  <a:lumMod val="60000"/>
+                  <a:lumOff val="40000"/>
+                </a:schemeClr>
+              </a:solidFill>
+            </a:ln>
+          </p:spPr>
+          <p:style>
+            <a:lnRef idx="2">
+              <a:schemeClr val="accent1">
+                <a:shade val="50000"/>
+              </a:schemeClr>
+            </a:lnRef>
+            <a:fillRef idx="1">
+              <a:schemeClr val="accent1"/>
+            </a:fillRef>
+            <a:effectRef idx="0">
+              <a:schemeClr val="accent1"/>
+            </a:effectRef>
+            <a:fontRef idx="minor">
+              <a:schemeClr val="lt1"/>
+            </a:fontRef>
+          </p:style>
+          <p:txBody>
+            <a:bodyPr rtlCol="0" anchor="ctr"/>
+            <a:lstStyle/>
+            <a:p>
+              <a:pPr algn="ctr"/>
+              <a:endParaRPr lang="en-CA" dirty="0"/>
+            </a:p>
+          </p:txBody>
+        </p:sp>
+      </p:grpSp>
+    </p:spTree>
+    <p:extLst>
+      <p:ext uri="{BB962C8B-B14F-4D97-AF65-F5344CB8AC3E}">
+        <p14:creationId xmlns:p14="http://schemas.microsoft.com/office/powerpoint/2010/main" val="1929151069"/>
+      </p:ext>
+    </p:extLst>
+  </p:cSld>
+  <p:clrMapOvr>
+    <a:masterClrMapping/>
+  </p:clrMapOvr>
+  <p:timing>
+    <p:tnLst>
+      <p:par>
+        <p:cTn id="1" dur="indefinite" restart="never" nodeType="tmRoot">
+          <p:childTnLst>
+            <p:seq concurrent="1" nextAc="seek">
+              <p:cTn id="2" dur="indefinite" nodeType="mainSeq">
+                <p:childTnLst>
+                  <p:par>
+                    <p:cTn id="3" fill="hold">
+                      <p:stCondLst>
+                        <p:cond delay="indefinite"/>
+                      </p:stCondLst>
+                      <p:childTnLst>
+                        <p:par>
+                          <p:cTn id="4" fill="hold">
+                            <p:stCondLst>
+                              <p:cond delay="0"/>
+                            </p:stCondLst>
+                            <p:childTnLst>
+                              <p:par>
+                                <p:cTn id="5" presetID="1" presetClass="entr" presetSubtype="0" fill="hold" nodeType="clickEffect">
+                                  <p:stCondLst>
+                                    <p:cond delay="0"/>
+                                  </p:stCondLst>
+                                  <p:childTnLst>
+                                    <p:set>
+                                      <p:cBhvr>
+                                        <p:cTn id="6" dur="1" fill="hold">
+                                          <p:stCondLst>
+                                            <p:cond delay="0"/>
+                                          </p:stCondLst>
+                                        </p:cTn>
+                                        <p:tgtEl>
+                                          <p:spTgt spid="15"/>
+                                        </p:tgtEl>
+                                        <p:attrNameLst>
+                                          <p:attrName>style.visibility</p:attrName>
+                                        </p:attrNameLst>
+                                      </p:cBhvr>
+                                      <p:to>
+                                        <p:strVal val="visible"/>
+                                      </p:to>
+                                    </p:set>
+                                  </p:childTnLst>
+                                </p:cTn>
+                              </p:par>
+                            </p:childTnLst>
+                          </p:cTn>
+                        </p:par>
+                      </p:childTnLst>
+                    </p:cTn>
+                  </p:par>
+                </p:childTnLst>
+              </p:cTn>
+              <p:prevCondLst>
+                <p:cond evt="onPrev" delay="0">
+                  <p:tgtEl>
+                    <p:sldTgt/>
+                  </p:tgtEl>
+                </p:cond>
+              </p:prevCondLst>
+              <p:nextCondLst>
+                <p:cond evt="onNext" delay="0">
+                  <p:tgtEl>
+                    <p:sldTgt/>
+                  </p:tgtEl>
+                </p:cond>
+              </p:nextCondLst>
+            </p:seq>
+          </p:childTnLst>
+        </p:cTn>
+      </p:par>
+    </p:tnLst>
+  </p:timing>
+</p:sld>
+</file>
+
+<file path=ppt/slides/slide9.xml><?xml version="1.0" encoding="utf-8"?>
+<p:sld xmlns:a="http://schemas.openxmlformats.org/drawingml/2006/main" xmlns:r="http://schemas.openxmlformats.org/officeDocument/2006/relationships" xmlns:p="http://schemas.openxmlformats.org/presentationml/2006/main">
+  <p:cSld>
+    <p:spTree>
+      <p:nvGrpSpPr>
+        <p:cNvPr id="1" name=""/>
+        <p:cNvGrpSpPr/>
+        <p:nvPr/>
+      </p:nvGrpSpPr>
+      <p:grpSpPr>
+        <a:xfrm>
+          <a:off x="0" y="0"/>
+          <a:ext cx="0" cy="0"/>
+          <a:chOff x="0" y="0"/>
+          <a:chExt cx="0" cy="0"/>
+        </a:xfrm>
+      </p:grpSpPr>
+      <p:pic>
+        <p:nvPicPr>
+          <p:cNvPr id="2" name="Picture 1">
+            <a:extLst>
+              <a:ext uri="{FF2B5EF4-FFF2-40B4-BE49-F238E27FC236}">
+                <a16:creationId xmlns:a16="http://schemas.microsoft.com/office/drawing/2014/main" id="{B3BE7671-4100-4ADA-B60A-B36F5764C695}"/>
+              </a:ext>
+            </a:extLst>
+          </p:cNvPr>
+          <p:cNvPicPr>
+            <a:picLocks noChangeAspect="1"/>
+          </p:cNvPicPr>
+          <p:nvPr/>
+        </p:nvPicPr>
+        <p:blipFill>
+          <a:blip r:embed="rId2"/>
+          <a:stretch>
+            <a:fillRect/>
+          </a:stretch>
+        </p:blipFill>
+        <p:spPr>
+          <a:xfrm>
+            <a:off x="1047346" y="909980"/>
+            <a:ext cx="3301556" cy="2519020"/>
+          </a:xfrm>
+          <a:prstGeom prst="rect">
+            <a:avLst/>
+          </a:prstGeom>
+        </p:spPr>
+      </p:pic>
+      <p:pic>
+        <p:nvPicPr>
+          <p:cNvPr id="3" name="Picture 2">
+            <a:extLst>
+              <a:ext uri="{FF2B5EF4-FFF2-40B4-BE49-F238E27FC236}">
+                <a16:creationId xmlns:a16="http://schemas.microsoft.com/office/drawing/2014/main" id="{A7C2FCBB-4244-4EE0-A19D-4BB72E89BF2B}"/>
+              </a:ext>
+            </a:extLst>
+          </p:cNvPr>
+          <p:cNvPicPr>
+            <a:picLocks noChangeAspect="1"/>
+          </p:cNvPicPr>
+          <p:nvPr/>
+        </p:nvPicPr>
+        <p:blipFill>
+          <a:blip r:embed="rId3"/>
+          <a:stretch>
+            <a:fillRect/>
+          </a:stretch>
+        </p:blipFill>
+        <p:spPr>
+          <a:xfrm>
+            <a:off x="1129326" y="3429000"/>
+            <a:ext cx="3137595" cy="3167406"/>
+          </a:xfrm>
+          <a:prstGeom prst="rect">
+            <a:avLst/>
+          </a:prstGeom>
+        </p:spPr>
+      </p:pic>
+      <p:pic>
+        <p:nvPicPr>
+          <p:cNvPr id="4" name="Picture 3">
+            <a:extLst>
+              <a:ext uri="{FF2B5EF4-FFF2-40B4-BE49-F238E27FC236}">
+                <a16:creationId xmlns:a16="http://schemas.microsoft.com/office/drawing/2014/main" id="{BA95D735-DA0B-4281-837F-34E3BE128E8A}"/>
+              </a:ext>
+            </a:extLst>
+          </p:cNvPr>
+          <p:cNvPicPr>
+            <a:picLocks noChangeAspect="1"/>
+          </p:cNvPicPr>
+          <p:nvPr/>
+        </p:nvPicPr>
+        <p:blipFill rotWithShape="1">
+          <a:blip r:embed="rId4"/>
+          <a:srcRect l="11081"/>
+          <a:stretch/>
+        </p:blipFill>
+        <p:spPr>
+          <a:xfrm>
+            <a:off x="4944596" y="119992"/>
+            <a:ext cx="3386341" cy="3309008"/>
+          </a:xfrm>
+          <a:prstGeom prst="rect">
+            <a:avLst/>
+          </a:prstGeom>
+        </p:spPr>
+      </p:pic>
+      <p:sp>
+        <p:nvSpPr>
+          <p:cNvPr id="6" name="TextBox 5">
+            <a:extLst>
+              <a:ext uri="{FF2B5EF4-FFF2-40B4-BE49-F238E27FC236}">
+                <a16:creationId xmlns:a16="http://schemas.microsoft.com/office/drawing/2014/main" id="{FB850CA8-8715-4BA4-9996-A45DC54D6D10}"/>
+              </a:ext>
+            </a:extLst>
+          </p:cNvPr>
+          <p:cNvSpPr txBox="1"/>
+          <p:nvPr/>
+        </p:nvSpPr>
+        <p:spPr>
+          <a:xfrm>
+            <a:off x="1047346" y="261594"/>
+            <a:ext cx="2169579" cy="338554"/>
+          </a:xfrm>
+          <a:prstGeom prst="rect">
+            <a:avLst/>
+          </a:prstGeom>
+          <a:noFill/>
+        </p:spPr>
+        <p:txBody>
+          <a:bodyPr wrap="square" rtlCol="0">
+            <a:spAutoFit/>
+          </a:bodyPr>
+          <a:lstStyle/>
+          <a:p>
+            <a:pPr marL="285750" indent="-285750">
+              <a:buFont typeface="Arial" panose="020B0604020202020204" pitchFamily="34" charset="0"/>
+              <a:buChar char="•"/>
+            </a:pPr>
+            <a:r>
+              <a:rPr lang="en-CA" sz="1600" dirty="0"/>
+              <a:t>(924, 24)</a:t>
+            </a:r>
+          </a:p>
+        </p:txBody>
+      </p:sp>
+    </p:spTree>
+    <p:extLst>
+      <p:ext uri="{BB962C8B-B14F-4D97-AF65-F5344CB8AC3E}">
+        <p14:creationId xmlns:p14="http://schemas.microsoft.com/office/powerpoint/2010/main" val="1640410112"/>
+      </p:ext>
+    </p:extLst>
+  </p:cSld>
+  <p:clrMapOvr>
+    <a:masterClrMapping/>
+  </p:clrMapOvr>
+  <p:timing>
+    <p:tnLst>
+      <p:par>
+        <p:cTn id="1" dur="indefinite" restart="never" nodeType="tmRoot">
+          <p:childTnLst>
+            <p:seq concurrent="1" nextAc="seek">
+              <p:cTn id="2" dur="indefinite" nodeType="mainSeq">
+                <p:childTnLst>
+                  <p:par>
+                    <p:cTn id="3" fill="hold">
+                      <p:stCondLst>
+                        <p:cond delay="indefinite"/>
+                      </p:stCondLst>
+                      <p:childTnLst>
+                        <p:par>
+                          <p:cTn id="4" fill="hold">
+                            <p:stCondLst>
+                              <p:cond delay="0"/>
+                            </p:stCondLst>
+                            <p:childTnLst>
+                              <p:par>
+                                <p:cTn id="5" presetID="1" presetClass="entr" presetSubtype="0" fill="hold" nodeType="clickEffect">
+                                  <p:stCondLst>
+                                    <p:cond delay="0"/>
+                                  </p:stCondLst>
+                                  <p:childTnLst>
+                                    <p:set>
+                                      <p:cBhvr>
+                                        <p:cTn id="6" dur="1" fill="hold">
+                                          <p:stCondLst>
+                                            <p:cond delay="0"/>
+                                          </p:stCondLst>
+                                        </p:cTn>
+                                        <p:tgtEl>
+                                          <p:spTgt spid="4"/>
+                                        </p:tgtEl>
+                                        <p:attrNameLst>
+                                          <p:attrName>style.visibility</p:attrName>
+                                        </p:attrNameLst>
+                                      </p:cBhvr>
+                                      <p:to>
+                                        <p:strVal val="visible"/>
+                                      </p:to>
+                                    </p:set>
+                                  </p:childTnLst>
+                                </p:cTn>
+                              </p:par>
+                            </p:childTnLst>
+                          </p:cTn>
+                        </p:par>
+                      </p:childTnLst>
+                    </p:cTn>
+                  </p:par>
+                </p:childTnLst>
+              </p:cTn>
+              <p:prevCondLst>
+                <p:cond evt="onPrev" delay="0">
+                  <p:tgtEl>
+                    <p:sldTgt/>
+                  </p:tgtEl>
+                </p:cond>
+              </p:prevCondLst>
+              <p:nextCondLst>
+                <p:cond evt="onNext" delay="0">
+                  <p:tgtEl>
+                    <p:sldTgt/>
+                  </p:tgtEl>
+                </p:cond>
+              </p:nextCondLst>
+            </p:seq>
+          </p:childTnLst>
+        </p:cTn>
+      </p:par>
+    </p:tnLst>
+  </p:timing>
 </p:sld>
 </file>
 

</xml_diff>